<commit_message>
Made significant changes to club performance page
</commit_message>
<xml_diff>
--- a/Design Powerpoints.pptx
+++ b/Design Powerpoints.pptx
@@ -7,7 +7,8 @@
   <p:sldIdLst>
     <p:sldId id="256" r:id="rId2"/>
     <p:sldId id="257" r:id="rId3"/>
-    <p:sldId id="258" r:id="rId4"/>
+    <p:sldId id="259" r:id="rId4"/>
+    <p:sldId id="258" r:id="rId5"/>
   </p:sldIdLst>
   <p:sldSz cx="12192000" cy="6858000"/>
   <p:notesSz cx="6858000" cy="9144000"/>
@@ -127,7 +128,7 @@
   <pc:docChgLst>
     <pc:chgData name="Jeffrey Jose" userId="6e4416676935328d" providerId="LiveId" clId="{10ADB0FA-12AB-49A0-A398-7B87A2DF4CCE}"/>
     <pc:docChg chg="addSld modSld">
-      <pc:chgData name="Jeffrey Jose" userId="6e4416676935328d" providerId="LiveId" clId="{10ADB0FA-12AB-49A0-A398-7B87A2DF4CCE}" dt="2023-08-22T03:06:46.466" v="13" actId="14100"/>
+      <pc:chgData name="Jeffrey Jose" userId="6e4416676935328d" providerId="LiveId" clId="{10ADB0FA-12AB-49A0-A398-7B87A2DF4CCE}" dt="2023-09-02T03:35:48.766" v="14" actId="2890"/>
       <pc:docMkLst>
         <pc:docMk/>
       </pc:docMkLst>
@@ -177,6 +178,13 @@
           </ac:spMkLst>
         </pc:spChg>
       </pc:sldChg>
+      <pc:sldChg chg="add">
+        <pc:chgData name="Jeffrey Jose" userId="6e4416676935328d" providerId="LiveId" clId="{10ADB0FA-12AB-49A0-A398-7B87A2DF4CCE}" dt="2023-09-02T03:35:48.766" v="14" actId="2890"/>
+        <pc:sldMkLst>
+          <pc:docMk/>
+          <pc:sldMk cId="3316235719" sldId="259"/>
+        </pc:sldMkLst>
+      </pc:sldChg>
     </pc:docChg>
   </pc:docChgLst>
 </pc:chgInfo>
@@ -331,7 +339,7 @@
           <a:p>
             <a:fld id="{262DC6FD-3767-4583-BFC9-BB4786788C22}" type="datetimeFigureOut">
               <a:rPr lang="en-NZ" smtClean="0"/>
-              <a:t>22/08/2023</a:t>
+              <a:t>2/09/2023</a:t>
             </a:fld>
             <a:endParaRPr lang="en-NZ"/>
           </a:p>
@@ -531,7 +539,7 @@
           <a:p>
             <a:fld id="{262DC6FD-3767-4583-BFC9-BB4786788C22}" type="datetimeFigureOut">
               <a:rPr lang="en-NZ" smtClean="0"/>
-              <a:t>22/08/2023</a:t>
+              <a:t>2/09/2023</a:t>
             </a:fld>
             <a:endParaRPr lang="en-NZ"/>
           </a:p>
@@ -741,7 +749,7 @@
           <a:p>
             <a:fld id="{262DC6FD-3767-4583-BFC9-BB4786788C22}" type="datetimeFigureOut">
               <a:rPr lang="en-NZ" smtClean="0"/>
-              <a:t>22/08/2023</a:t>
+              <a:t>2/09/2023</a:t>
             </a:fld>
             <a:endParaRPr lang="en-NZ"/>
           </a:p>
@@ -941,7 +949,7 @@
           <a:p>
             <a:fld id="{262DC6FD-3767-4583-BFC9-BB4786788C22}" type="datetimeFigureOut">
               <a:rPr lang="en-NZ" smtClean="0"/>
-              <a:t>22/08/2023</a:t>
+              <a:t>2/09/2023</a:t>
             </a:fld>
             <a:endParaRPr lang="en-NZ"/>
           </a:p>
@@ -1217,7 +1225,7 @@
           <a:p>
             <a:fld id="{262DC6FD-3767-4583-BFC9-BB4786788C22}" type="datetimeFigureOut">
               <a:rPr lang="en-NZ" smtClean="0"/>
-              <a:t>22/08/2023</a:t>
+              <a:t>2/09/2023</a:t>
             </a:fld>
             <a:endParaRPr lang="en-NZ"/>
           </a:p>
@@ -1485,7 +1493,7 @@
           <a:p>
             <a:fld id="{262DC6FD-3767-4583-BFC9-BB4786788C22}" type="datetimeFigureOut">
               <a:rPr lang="en-NZ" smtClean="0"/>
-              <a:t>22/08/2023</a:t>
+              <a:t>2/09/2023</a:t>
             </a:fld>
             <a:endParaRPr lang="en-NZ"/>
           </a:p>
@@ -1900,7 +1908,7 @@
           <a:p>
             <a:fld id="{262DC6FD-3767-4583-BFC9-BB4786788C22}" type="datetimeFigureOut">
               <a:rPr lang="en-NZ" smtClean="0"/>
-              <a:t>22/08/2023</a:t>
+              <a:t>2/09/2023</a:t>
             </a:fld>
             <a:endParaRPr lang="en-NZ"/>
           </a:p>
@@ -2042,7 +2050,7 @@
           <a:p>
             <a:fld id="{262DC6FD-3767-4583-BFC9-BB4786788C22}" type="datetimeFigureOut">
               <a:rPr lang="en-NZ" smtClean="0"/>
-              <a:t>22/08/2023</a:t>
+              <a:t>2/09/2023</a:t>
             </a:fld>
             <a:endParaRPr lang="en-NZ"/>
           </a:p>
@@ -2155,7 +2163,7 @@
           <a:p>
             <a:fld id="{262DC6FD-3767-4583-BFC9-BB4786788C22}" type="datetimeFigureOut">
               <a:rPr lang="en-NZ" smtClean="0"/>
-              <a:t>22/08/2023</a:t>
+              <a:t>2/09/2023</a:t>
             </a:fld>
             <a:endParaRPr lang="en-NZ"/>
           </a:p>
@@ -2468,7 +2476,7 @@
           <a:p>
             <a:fld id="{262DC6FD-3767-4583-BFC9-BB4786788C22}" type="datetimeFigureOut">
               <a:rPr lang="en-NZ" smtClean="0"/>
-              <a:t>22/08/2023</a:t>
+              <a:t>2/09/2023</a:t>
             </a:fld>
             <a:endParaRPr lang="en-NZ"/>
           </a:p>
@@ -2757,7 +2765,7 @@
           <a:p>
             <a:fld id="{262DC6FD-3767-4583-BFC9-BB4786788C22}" type="datetimeFigureOut">
               <a:rPr lang="en-NZ" smtClean="0"/>
-              <a:t>22/08/2023</a:t>
+              <a:t>2/09/2023</a:t>
             </a:fld>
             <a:endParaRPr lang="en-NZ"/>
           </a:p>
@@ -3000,7 +3008,7 @@
           <a:p>
             <a:fld id="{262DC6FD-3767-4583-BFC9-BB4786788C22}" type="datetimeFigureOut">
               <a:rPr lang="en-NZ" smtClean="0"/>
-              <a:t>22/08/2023</a:t>
+              <a:t>2/09/2023</a:t>
             </a:fld>
             <a:endParaRPr lang="en-NZ"/>
           </a:p>
@@ -4333,6 +4341,368 @@
           </a:p>
         </p:txBody>
       </p:sp>
+    </p:spTree>
+    <p:extLst>
+      <p:ext uri="{BB962C8B-B14F-4D97-AF65-F5344CB8AC3E}">
+        <p14:creationId xmlns:p14="http://schemas.microsoft.com/office/powerpoint/2010/main" val="3316235719"/>
+      </p:ext>
+    </p:extLst>
+  </p:cSld>
+  <p:clrMapOvr>
+    <a:masterClrMapping/>
+  </p:clrMapOvr>
+</p:sld>
+</file>
+
+<file path=ppt/slides/slide4.xml><?xml version="1.0" encoding="utf-8"?>
+<p:sld xmlns:a="http://schemas.openxmlformats.org/drawingml/2006/main" xmlns:r="http://schemas.openxmlformats.org/officeDocument/2006/relationships" xmlns:p="http://schemas.openxmlformats.org/presentationml/2006/main">
+  <p:cSld>
+    <p:bg>
+      <p:bgPr>
+        <a:solidFill>
+          <a:srgbClr val="FF005C"/>
+        </a:solidFill>
+        <a:effectLst/>
+      </p:bgPr>
+    </p:bg>
+    <p:spTree>
+      <p:nvGrpSpPr>
+        <p:cNvPr id="1" name=""/>
+        <p:cNvGrpSpPr/>
+        <p:nvPr/>
+      </p:nvGrpSpPr>
+      <p:grpSpPr>
+        <a:xfrm>
+          <a:off x="0" y="0"/>
+          <a:ext cx="0" cy="0"/>
+          <a:chOff x="0" y="0"/>
+          <a:chExt cx="0" cy="0"/>
+        </a:xfrm>
+      </p:grpSpPr>
+      <p:sp>
+        <p:nvSpPr>
+          <p:cNvPr id="8" name="Rectangle 7">
+            <a:extLst>
+              <a:ext uri="{FF2B5EF4-FFF2-40B4-BE49-F238E27FC236}">
+                <a16:creationId xmlns:a16="http://schemas.microsoft.com/office/drawing/2014/main" id="{D760365A-5D30-822A-AEEF-0DF1CB63C00D}"/>
+              </a:ext>
+            </a:extLst>
+          </p:cNvPr>
+          <p:cNvSpPr/>
+          <p:nvPr/>
+        </p:nvSpPr>
+        <p:spPr>
+          <a:xfrm>
+            <a:off x="-9331" y="149290"/>
+            <a:ext cx="9685176" cy="718457"/>
+          </a:xfrm>
+          <a:prstGeom prst="rect">
+            <a:avLst/>
+          </a:prstGeom>
+          <a:solidFill>
+            <a:srgbClr val="37003C"/>
+          </a:solidFill>
+          <a:ln>
+            <a:solidFill>
+              <a:srgbClr val="37003C"/>
+            </a:solidFill>
+          </a:ln>
+        </p:spPr>
+        <p:style>
+          <a:lnRef idx="2">
+            <a:schemeClr val="accent1">
+              <a:shade val="15000"/>
+            </a:schemeClr>
+          </a:lnRef>
+          <a:fillRef idx="1">
+            <a:schemeClr val="accent1"/>
+          </a:fillRef>
+          <a:effectRef idx="0">
+            <a:schemeClr val="accent1"/>
+          </a:effectRef>
+          <a:fontRef idx="minor">
+            <a:schemeClr val="lt1"/>
+          </a:fontRef>
+        </p:style>
+        <p:txBody>
+          <a:bodyPr rtlCol="0" anchor="ctr"/>
+          <a:lstStyle/>
+          <a:p>
+            <a:pPr algn="ctr"/>
+            <a:endParaRPr lang="en-NZ"/>
+          </a:p>
+        </p:txBody>
+      </p:sp>
+      <p:sp>
+        <p:nvSpPr>
+          <p:cNvPr id="9" name="Rectangle 8">
+            <a:extLst>
+              <a:ext uri="{FF2B5EF4-FFF2-40B4-BE49-F238E27FC236}">
+                <a16:creationId xmlns:a16="http://schemas.microsoft.com/office/drawing/2014/main" id="{36C2724A-FF6F-6DC2-3EA8-3CBC888DB530}"/>
+              </a:ext>
+            </a:extLst>
+          </p:cNvPr>
+          <p:cNvSpPr/>
+          <p:nvPr/>
+        </p:nvSpPr>
+        <p:spPr>
+          <a:xfrm>
+            <a:off x="2506824" y="1001485"/>
+            <a:ext cx="9685176" cy="491413"/>
+          </a:xfrm>
+          <a:prstGeom prst="rect">
+            <a:avLst/>
+          </a:prstGeom>
+          <a:solidFill>
+            <a:srgbClr val="37003C"/>
+          </a:solidFill>
+          <a:ln>
+            <a:solidFill>
+              <a:srgbClr val="37003C"/>
+            </a:solidFill>
+          </a:ln>
+        </p:spPr>
+        <p:style>
+          <a:lnRef idx="2">
+            <a:schemeClr val="accent1">
+              <a:shade val="15000"/>
+            </a:schemeClr>
+          </a:lnRef>
+          <a:fillRef idx="1">
+            <a:schemeClr val="accent1"/>
+          </a:fillRef>
+          <a:effectRef idx="0">
+            <a:schemeClr val="accent1"/>
+          </a:effectRef>
+          <a:fontRef idx="minor">
+            <a:schemeClr val="lt1"/>
+          </a:fontRef>
+        </p:style>
+        <p:txBody>
+          <a:bodyPr rtlCol="0" anchor="ctr"/>
+          <a:lstStyle/>
+          <a:p>
+            <a:pPr algn="ctr"/>
+            <a:endParaRPr lang="en-NZ"/>
+          </a:p>
+        </p:txBody>
+      </p:sp>
+      <p:sp>
+        <p:nvSpPr>
+          <p:cNvPr id="10" name="Isosceles Triangle 9">
+            <a:extLst>
+              <a:ext uri="{FF2B5EF4-FFF2-40B4-BE49-F238E27FC236}">
+                <a16:creationId xmlns:a16="http://schemas.microsoft.com/office/drawing/2014/main" id="{34F2997E-8337-76FA-2D89-52EDC479D7CC}"/>
+              </a:ext>
+            </a:extLst>
+          </p:cNvPr>
+          <p:cNvSpPr/>
+          <p:nvPr/>
+        </p:nvSpPr>
+        <p:spPr>
+          <a:xfrm>
+            <a:off x="1161660" y="999930"/>
+            <a:ext cx="2690328" cy="1433805"/>
+          </a:xfrm>
+          <a:prstGeom prst="triangle">
+            <a:avLst/>
+          </a:prstGeom>
+          <a:solidFill>
+            <a:srgbClr val="FF005C"/>
+          </a:solidFill>
+          <a:ln>
+            <a:solidFill>
+              <a:srgbClr val="FF005C"/>
+            </a:solidFill>
+          </a:ln>
+        </p:spPr>
+        <p:style>
+          <a:lnRef idx="2">
+            <a:schemeClr val="accent1">
+              <a:shade val="15000"/>
+            </a:schemeClr>
+          </a:lnRef>
+          <a:fillRef idx="1">
+            <a:schemeClr val="accent1"/>
+          </a:fillRef>
+          <a:effectRef idx="0">
+            <a:schemeClr val="accent1"/>
+          </a:effectRef>
+          <a:fontRef idx="minor">
+            <a:schemeClr val="lt1"/>
+          </a:fontRef>
+        </p:style>
+        <p:txBody>
+          <a:bodyPr rtlCol="0" anchor="ctr"/>
+          <a:lstStyle/>
+          <a:p>
+            <a:pPr algn="ctr"/>
+            <a:endParaRPr lang="en-NZ"/>
+          </a:p>
+        </p:txBody>
+      </p:sp>
+      <p:sp>
+        <p:nvSpPr>
+          <p:cNvPr id="11" name="Isosceles Triangle 10">
+            <a:extLst>
+              <a:ext uri="{FF2B5EF4-FFF2-40B4-BE49-F238E27FC236}">
+                <a16:creationId xmlns:a16="http://schemas.microsoft.com/office/drawing/2014/main" id="{CF6AB740-0534-2D7F-339F-E466EF2A1AA4}"/>
+              </a:ext>
+            </a:extLst>
+          </p:cNvPr>
+          <p:cNvSpPr/>
+          <p:nvPr/>
+        </p:nvSpPr>
+        <p:spPr>
+          <a:xfrm>
+            <a:off x="8462865" y="83198"/>
+            <a:ext cx="2698103" cy="850640"/>
+          </a:xfrm>
+          <a:prstGeom prst="triangle">
+            <a:avLst/>
+          </a:prstGeom>
+          <a:solidFill>
+            <a:srgbClr val="FF005C"/>
+          </a:solidFill>
+          <a:ln>
+            <a:solidFill>
+              <a:srgbClr val="FF005C"/>
+            </a:solidFill>
+          </a:ln>
+        </p:spPr>
+        <p:style>
+          <a:lnRef idx="2">
+            <a:schemeClr val="accent1">
+              <a:shade val="15000"/>
+            </a:schemeClr>
+          </a:lnRef>
+          <a:fillRef idx="1">
+            <a:schemeClr val="accent1"/>
+          </a:fillRef>
+          <a:effectRef idx="0">
+            <a:schemeClr val="accent1"/>
+          </a:effectRef>
+          <a:fontRef idx="minor">
+            <a:schemeClr val="lt1"/>
+          </a:fontRef>
+        </p:style>
+        <p:txBody>
+          <a:bodyPr rtlCol="0" anchor="ctr"/>
+          <a:lstStyle/>
+          <a:p>
+            <a:pPr algn="ctr"/>
+            <a:endParaRPr lang="en-NZ"/>
+          </a:p>
+        </p:txBody>
+      </p:sp>
+      <p:sp>
+        <p:nvSpPr>
+          <p:cNvPr id="2" name="Rectangle 1">
+            <a:extLst>
+              <a:ext uri="{FF2B5EF4-FFF2-40B4-BE49-F238E27FC236}">
+                <a16:creationId xmlns:a16="http://schemas.microsoft.com/office/drawing/2014/main" id="{67EBDA7E-9A82-6B4B-1CA1-6D3D5A903FB0}"/>
+              </a:ext>
+            </a:extLst>
+          </p:cNvPr>
+          <p:cNvSpPr/>
+          <p:nvPr/>
+        </p:nvSpPr>
+        <p:spPr>
+          <a:xfrm>
+            <a:off x="0" y="1625081"/>
+            <a:ext cx="9685176" cy="491413"/>
+          </a:xfrm>
+          <a:prstGeom prst="rect">
+            <a:avLst/>
+          </a:prstGeom>
+          <a:solidFill>
+            <a:srgbClr val="37003C"/>
+          </a:solidFill>
+          <a:ln>
+            <a:solidFill>
+              <a:srgbClr val="37003C"/>
+            </a:solidFill>
+          </a:ln>
+        </p:spPr>
+        <p:style>
+          <a:lnRef idx="2">
+            <a:schemeClr val="accent1">
+              <a:shade val="15000"/>
+            </a:schemeClr>
+          </a:lnRef>
+          <a:fillRef idx="1">
+            <a:schemeClr val="accent1"/>
+          </a:fillRef>
+          <a:effectRef idx="0">
+            <a:schemeClr val="accent1"/>
+          </a:effectRef>
+          <a:fontRef idx="minor">
+            <a:schemeClr val="lt1"/>
+          </a:fontRef>
+        </p:style>
+        <p:txBody>
+          <a:bodyPr rtlCol="0" anchor="ctr"/>
+          <a:lstStyle/>
+          <a:p>
+            <a:pPr algn="ctr"/>
+            <a:endParaRPr lang="en-NZ"/>
+          </a:p>
+        </p:txBody>
+      </p:sp>
+      <p:sp>
+        <p:nvSpPr>
+          <p:cNvPr id="3" name="Isosceles Triangle 2">
+            <a:extLst>
+              <a:ext uri="{FF2B5EF4-FFF2-40B4-BE49-F238E27FC236}">
+                <a16:creationId xmlns:a16="http://schemas.microsoft.com/office/drawing/2014/main" id="{6F45ECE6-BF8D-4937-15F6-E7FC3D72BD16}"/>
+              </a:ext>
+            </a:extLst>
+          </p:cNvPr>
+          <p:cNvSpPr/>
+          <p:nvPr/>
+        </p:nvSpPr>
+        <p:spPr>
+          <a:xfrm>
+            <a:off x="8340014" y="1625081"/>
+            <a:ext cx="2690328" cy="1433805"/>
+          </a:xfrm>
+          <a:prstGeom prst="triangle">
+            <a:avLst/>
+          </a:prstGeom>
+          <a:solidFill>
+            <a:srgbClr val="FF005C"/>
+          </a:solidFill>
+          <a:ln>
+            <a:solidFill>
+              <a:srgbClr val="FF005C"/>
+            </a:solidFill>
+          </a:ln>
+        </p:spPr>
+        <p:style>
+          <a:lnRef idx="2">
+            <a:schemeClr val="accent1">
+              <a:shade val="15000"/>
+            </a:schemeClr>
+          </a:lnRef>
+          <a:fillRef idx="1">
+            <a:schemeClr val="accent1"/>
+          </a:fillRef>
+          <a:effectRef idx="0">
+            <a:schemeClr val="accent1"/>
+          </a:effectRef>
+          <a:fontRef idx="minor">
+            <a:schemeClr val="lt1"/>
+          </a:fontRef>
+        </p:style>
+        <p:txBody>
+          <a:bodyPr rtlCol="0" anchor="ctr"/>
+          <a:lstStyle/>
+          <a:p>
+            <a:pPr algn="ctr"/>
+            <a:endParaRPr lang="en-NZ"/>
+          </a:p>
+        </p:txBody>
+      </p:sp>
       <p:sp>
         <p:nvSpPr>
           <p:cNvPr id="4" name="Rectangle 3">

</xml_diff>

<commit_message>
Completed Code For Player Stats
</commit_message>
<xml_diff>
--- a/Design Powerpoints.pptx
+++ b/Design Powerpoints.pptx
@@ -8,7 +8,9 @@
     <p:sldId id="256" r:id="rId2"/>
     <p:sldId id="257" r:id="rId3"/>
     <p:sldId id="259" r:id="rId4"/>
-    <p:sldId id="258" r:id="rId5"/>
+    <p:sldId id="260" r:id="rId5"/>
+    <p:sldId id="258" r:id="rId6"/>
+    <p:sldId id="261" r:id="rId7"/>
   </p:sldIdLst>
   <p:sldSz cx="12192000" cy="6858000"/>
   <p:notesSz cx="6858000" cy="9144000"/>
@@ -118,7 +120,7 @@
 <file path=ppt/revisionInfo.xml><?xml version="1.0" encoding="utf-8"?>
 <p1510:revInfo xmlns:a="http://schemas.openxmlformats.org/drawingml/2006/main" xmlns:r="http://schemas.openxmlformats.org/officeDocument/2006/relationships" xmlns:p1510="http://schemas.microsoft.com/office/powerpoint/2015/10/main">
   <p1510:revLst>
-    <p1510:client id="{10ADB0FA-12AB-49A0-A398-7B87A2DF4CCE}" v="3" dt="2023-08-22T03:06:26.144"/>
+    <p1510:client id="{10ADB0FA-12AB-49A0-A398-7B87A2DF4CCE}" v="16" dt="2023-09-16T07:58:56.760"/>
   </p1510:revLst>
 </p1510:revInfo>
 </file>
@@ -127,8 +129,8 @@
 <pc:chgInfo xmlns:a="http://schemas.openxmlformats.org/drawingml/2006/main" xmlns:r="http://schemas.openxmlformats.org/officeDocument/2006/relationships" xmlns:ac="http://schemas.microsoft.com/office/drawing/2013/main/command" xmlns:pc="http://schemas.microsoft.com/office/powerpoint/2013/main/command">
   <pc:docChgLst>
     <pc:chgData name="Jeffrey Jose" userId="6e4416676935328d" providerId="LiveId" clId="{10ADB0FA-12AB-49A0-A398-7B87A2DF4CCE}"/>
-    <pc:docChg chg="addSld modSld">
-      <pc:chgData name="Jeffrey Jose" userId="6e4416676935328d" providerId="LiveId" clId="{10ADB0FA-12AB-49A0-A398-7B87A2DF4CCE}" dt="2023-09-02T03:35:48.766" v="14" actId="2890"/>
+    <pc:docChg chg="undo custSel addSld modSld">
+      <pc:chgData name="Jeffrey Jose" userId="6e4416676935328d" providerId="LiveId" clId="{10ADB0FA-12AB-49A0-A398-7B87A2DF4CCE}" dt="2023-09-16T08:29:16.280" v="843" actId="207"/>
       <pc:docMkLst>
         <pc:docMk/>
       </pc:docMkLst>
@@ -178,12 +180,386 @@
           </ac:spMkLst>
         </pc:spChg>
       </pc:sldChg>
-      <pc:sldChg chg="add">
-        <pc:chgData name="Jeffrey Jose" userId="6e4416676935328d" providerId="LiveId" clId="{10ADB0FA-12AB-49A0-A398-7B87A2DF4CCE}" dt="2023-09-02T03:35:48.766" v="14" actId="2890"/>
+      <pc:sldChg chg="modSp add mod">
+        <pc:chgData name="Jeffrey Jose" userId="6e4416676935328d" providerId="LiveId" clId="{10ADB0FA-12AB-49A0-A398-7B87A2DF4CCE}" dt="2023-09-12T10:17:40.561" v="18" actId="1076"/>
         <pc:sldMkLst>
           <pc:docMk/>
           <pc:sldMk cId="3316235719" sldId="259"/>
         </pc:sldMkLst>
+        <pc:spChg chg="mod">
+          <ac:chgData name="Jeffrey Jose" userId="6e4416676935328d" providerId="LiveId" clId="{10ADB0FA-12AB-49A0-A398-7B87A2DF4CCE}" dt="2023-09-12T10:17:36.625" v="17" actId="14100"/>
+          <ac:spMkLst>
+            <pc:docMk/>
+            <pc:sldMk cId="3316235719" sldId="259"/>
+            <ac:spMk id="9" creationId="{36C2724A-FF6F-6DC2-3EA8-3CBC888DB530}"/>
+          </ac:spMkLst>
+        </pc:spChg>
+        <pc:spChg chg="mod">
+          <ac:chgData name="Jeffrey Jose" userId="6e4416676935328d" providerId="LiveId" clId="{10ADB0FA-12AB-49A0-A398-7B87A2DF4CCE}" dt="2023-09-12T10:17:40.561" v="18" actId="1076"/>
+          <ac:spMkLst>
+            <pc:docMk/>
+            <pc:sldMk cId="3316235719" sldId="259"/>
+            <ac:spMk id="10" creationId="{34F2997E-8337-76FA-2D89-52EDC479D7CC}"/>
+          </ac:spMkLst>
+        </pc:spChg>
+      </pc:sldChg>
+      <pc:sldChg chg="delSp add mod">
+        <pc:chgData name="Jeffrey Jose" userId="6e4416676935328d" providerId="LiveId" clId="{10ADB0FA-12AB-49A0-A398-7B87A2DF4CCE}" dt="2023-09-12T10:21:29.780" v="20" actId="478"/>
+        <pc:sldMkLst>
+          <pc:docMk/>
+          <pc:sldMk cId="2902817804" sldId="260"/>
+        </pc:sldMkLst>
+        <pc:spChg chg="del">
+          <ac:chgData name="Jeffrey Jose" userId="6e4416676935328d" providerId="LiveId" clId="{10ADB0FA-12AB-49A0-A398-7B87A2DF4CCE}" dt="2023-09-12T10:21:29.780" v="20" actId="478"/>
+          <ac:spMkLst>
+            <pc:docMk/>
+            <pc:sldMk cId="2902817804" sldId="260"/>
+            <ac:spMk id="2" creationId="{67EBDA7E-9A82-6B4B-1CA1-6D3D5A903FB0}"/>
+          </ac:spMkLst>
+        </pc:spChg>
+      </pc:sldChg>
+      <pc:sldChg chg="addSp delSp modSp new mod">
+        <pc:chgData name="Jeffrey Jose" userId="6e4416676935328d" providerId="LiveId" clId="{10ADB0FA-12AB-49A0-A398-7B87A2DF4CCE}" dt="2023-09-16T08:29:16.280" v="843" actId="207"/>
+        <pc:sldMkLst>
+          <pc:docMk/>
+          <pc:sldMk cId="339203755" sldId="261"/>
+        </pc:sldMkLst>
+        <pc:spChg chg="del">
+          <ac:chgData name="Jeffrey Jose" userId="6e4416676935328d" providerId="LiveId" clId="{10ADB0FA-12AB-49A0-A398-7B87A2DF4CCE}" dt="2023-09-16T07:38:05.366" v="22" actId="478"/>
+          <ac:spMkLst>
+            <pc:docMk/>
+            <pc:sldMk cId="339203755" sldId="261"/>
+            <ac:spMk id="2" creationId="{5B8F1F6B-9FED-C999-9F93-B0B5EE0A396E}"/>
+          </ac:spMkLst>
+        </pc:spChg>
+        <pc:spChg chg="del">
+          <ac:chgData name="Jeffrey Jose" userId="6e4416676935328d" providerId="LiveId" clId="{10ADB0FA-12AB-49A0-A398-7B87A2DF4CCE}" dt="2023-09-16T07:38:07.626" v="23" actId="478"/>
+          <ac:spMkLst>
+            <pc:docMk/>
+            <pc:sldMk cId="339203755" sldId="261"/>
+            <ac:spMk id="3" creationId="{41104C92-05B3-51B9-7150-1D1FA6887E9B}"/>
+          </ac:spMkLst>
+        </pc:spChg>
+        <pc:spChg chg="add del mod">
+          <ac:chgData name="Jeffrey Jose" userId="6e4416676935328d" providerId="LiveId" clId="{10ADB0FA-12AB-49A0-A398-7B87A2DF4CCE}" dt="2023-09-16T07:58:08.772" v="48" actId="478"/>
+          <ac:spMkLst>
+            <pc:docMk/>
+            <pc:sldMk cId="339203755" sldId="261"/>
+            <ac:spMk id="4" creationId="{E2533A45-C6C8-ABB7-31A4-76F00D662B50}"/>
+          </ac:spMkLst>
+        </pc:spChg>
+        <pc:spChg chg="add del mod">
+          <ac:chgData name="Jeffrey Jose" userId="6e4416676935328d" providerId="LiveId" clId="{10ADB0FA-12AB-49A0-A398-7B87A2DF4CCE}" dt="2023-09-16T07:58:08.772" v="48" actId="478"/>
+          <ac:spMkLst>
+            <pc:docMk/>
+            <pc:sldMk cId="339203755" sldId="261"/>
+            <ac:spMk id="5" creationId="{E872B8DD-DA30-B61E-1EF1-1535432C99E7}"/>
+          </ac:spMkLst>
+        </pc:spChg>
+        <pc:spChg chg="add del mod">
+          <ac:chgData name="Jeffrey Jose" userId="6e4416676935328d" providerId="LiveId" clId="{10ADB0FA-12AB-49A0-A398-7B87A2DF4CCE}" dt="2023-09-16T07:58:08.772" v="48" actId="478"/>
+          <ac:spMkLst>
+            <pc:docMk/>
+            <pc:sldMk cId="339203755" sldId="261"/>
+            <ac:spMk id="6" creationId="{2DA402AF-7C0A-B568-F742-C60C9E2FE787}"/>
+          </ac:spMkLst>
+        </pc:spChg>
+        <pc:spChg chg="add del mod">
+          <ac:chgData name="Jeffrey Jose" userId="6e4416676935328d" providerId="LiveId" clId="{10ADB0FA-12AB-49A0-A398-7B87A2DF4CCE}" dt="2023-09-16T07:58:08.772" v="48" actId="478"/>
+          <ac:spMkLst>
+            <pc:docMk/>
+            <pc:sldMk cId="339203755" sldId="261"/>
+            <ac:spMk id="7" creationId="{4EB77CCC-3C7A-4F3E-BF3D-2464E92E3A13}"/>
+          </ac:spMkLst>
+        </pc:spChg>
+        <pc:spChg chg="add del mod">
+          <ac:chgData name="Jeffrey Jose" userId="6e4416676935328d" providerId="LiveId" clId="{10ADB0FA-12AB-49A0-A398-7B87A2DF4CCE}" dt="2023-09-16T07:58:08.772" v="48" actId="478"/>
+          <ac:spMkLst>
+            <pc:docMk/>
+            <pc:sldMk cId="339203755" sldId="261"/>
+            <ac:spMk id="8" creationId="{E32808C2-F95E-95C0-EA94-345D47CC51D3}"/>
+          </ac:spMkLst>
+        </pc:spChg>
+        <pc:spChg chg="add del mod">
+          <ac:chgData name="Jeffrey Jose" userId="6e4416676935328d" providerId="LiveId" clId="{10ADB0FA-12AB-49A0-A398-7B87A2DF4CCE}" dt="2023-09-16T07:58:08.772" v="48" actId="478"/>
+          <ac:spMkLst>
+            <pc:docMk/>
+            <pc:sldMk cId="339203755" sldId="261"/>
+            <ac:spMk id="9" creationId="{B9EFD22B-061C-EE32-ADAC-A7B636ABB31B}"/>
+          </ac:spMkLst>
+        </pc:spChg>
+        <pc:spChg chg="add del mod">
+          <ac:chgData name="Jeffrey Jose" userId="6e4416676935328d" providerId="LiveId" clId="{10ADB0FA-12AB-49A0-A398-7B87A2DF4CCE}" dt="2023-09-16T07:58:08.772" v="48" actId="478"/>
+          <ac:spMkLst>
+            <pc:docMk/>
+            <pc:sldMk cId="339203755" sldId="261"/>
+            <ac:spMk id="10" creationId="{12061988-D788-EE83-48FE-2035204A05D9}"/>
+          </ac:spMkLst>
+        </pc:spChg>
+        <pc:spChg chg="add del mod">
+          <ac:chgData name="Jeffrey Jose" userId="6e4416676935328d" providerId="LiveId" clId="{10ADB0FA-12AB-49A0-A398-7B87A2DF4CCE}" dt="2023-09-16T07:58:08.772" v="48" actId="478"/>
+          <ac:spMkLst>
+            <pc:docMk/>
+            <pc:sldMk cId="339203755" sldId="261"/>
+            <ac:spMk id="11" creationId="{ED93D521-75D6-C32E-AAA7-59E0B77DBDE4}"/>
+          </ac:spMkLst>
+        </pc:spChg>
+        <pc:spChg chg="add del mod">
+          <ac:chgData name="Jeffrey Jose" userId="6e4416676935328d" providerId="LiveId" clId="{10ADB0FA-12AB-49A0-A398-7B87A2DF4CCE}" dt="2023-09-16T07:58:08.772" v="48" actId="478"/>
+          <ac:spMkLst>
+            <pc:docMk/>
+            <pc:sldMk cId="339203755" sldId="261"/>
+            <ac:spMk id="12" creationId="{FD845CE5-A8E1-29E1-A094-FF9A513E3AC3}"/>
+          </ac:spMkLst>
+        </pc:spChg>
+        <pc:spChg chg="add del mod">
+          <ac:chgData name="Jeffrey Jose" userId="6e4416676935328d" providerId="LiveId" clId="{10ADB0FA-12AB-49A0-A398-7B87A2DF4CCE}" dt="2023-09-16T07:58:08.772" v="48" actId="478"/>
+          <ac:spMkLst>
+            <pc:docMk/>
+            <pc:sldMk cId="339203755" sldId="261"/>
+            <ac:spMk id="13" creationId="{E2D1A197-BD6A-13DE-F128-2BA59498FBCE}"/>
+          </ac:spMkLst>
+        </pc:spChg>
+        <pc:spChg chg="add del mod">
+          <ac:chgData name="Jeffrey Jose" userId="6e4416676935328d" providerId="LiveId" clId="{10ADB0FA-12AB-49A0-A398-7B87A2DF4CCE}" dt="2023-09-16T07:58:08.772" v="48" actId="478"/>
+          <ac:spMkLst>
+            <pc:docMk/>
+            <pc:sldMk cId="339203755" sldId="261"/>
+            <ac:spMk id="14" creationId="{EDCA1540-0D66-2BA1-D41A-68245739FBEC}"/>
+          </ac:spMkLst>
+        </pc:spChg>
+        <pc:spChg chg="add del mod">
+          <ac:chgData name="Jeffrey Jose" userId="6e4416676935328d" providerId="LiveId" clId="{10ADB0FA-12AB-49A0-A398-7B87A2DF4CCE}" dt="2023-09-16T07:58:08.772" v="48" actId="478"/>
+          <ac:spMkLst>
+            <pc:docMk/>
+            <pc:sldMk cId="339203755" sldId="261"/>
+            <ac:spMk id="15" creationId="{AB6D86C8-656B-C418-E088-3AF969CD0770}"/>
+          </ac:spMkLst>
+        </pc:spChg>
+        <pc:spChg chg="add del mod">
+          <ac:chgData name="Jeffrey Jose" userId="6e4416676935328d" providerId="LiveId" clId="{10ADB0FA-12AB-49A0-A398-7B87A2DF4CCE}" dt="2023-09-16T07:58:08.772" v="48" actId="478"/>
+          <ac:spMkLst>
+            <pc:docMk/>
+            <pc:sldMk cId="339203755" sldId="261"/>
+            <ac:spMk id="16" creationId="{453237E2-844C-90E7-5101-F6A03DE62447}"/>
+          </ac:spMkLst>
+        </pc:spChg>
+        <pc:spChg chg="add del mod">
+          <ac:chgData name="Jeffrey Jose" userId="6e4416676935328d" providerId="LiveId" clId="{10ADB0FA-12AB-49A0-A398-7B87A2DF4CCE}" dt="2023-09-16T07:58:08.772" v="48" actId="478"/>
+          <ac:spMkLst>
+            <pc:docMk/>
+            <pc:sldMk cId="339203755" sldId="261"/>
+            <ac:spMk id="17" creationId="{9584E912-F291-501D-841F-9E5157E4CBFA}"/>
+          </ac:spMkLst>
+        </pc:spChg>
+        <pc:spChg chg="add del mod">
+          <ac:chgData name="Jeffrey Jose" userId="6e4416676935328d" providerId="LiveId" clId="{10ADB0FA-12AB-49A0-A398-7B87A2DF4CCE}" dt="2023-09-16T07:58:08.772" v="48" actId="478"/>
+          <ac:spMkLst>
+            <pc:docMk/>
+            <pc:sldMk cId="339203755" sldId="261"/>
+            <ac:spMk id="18" creationId="{E14C50AD-2450-6BC6-1722-8AE98E47DA9C}"/>
+          </ac:spMkLst>
+        </pc:spChg>
+        <pc:spChg chg="add del mod">
+          <ac:chgData name="Jeffrey Jose" userId="6e4416676935328d" providerId="LiveId" clId="{10ADB0FA-12AB-49A0-A398-7B87A2DF4CCE}" dt="2023-09-16T07:58:08.772" v="48" actId="478"/>
+          <ac:spMkLst>
+            <pc:docMk/>
+            <pc:sldMk cId="339203755" sldId="261"/>
+            <ac:spMk id="19" creationId="{26AC15E2-03AB-478C-D436-820F80A56467}"/>
+          </ac:spMkLst>
+        </pc:spChg>
+        <pc:spChg chg="add del mod">
+          <ac:chgData name="Jeffrey Jose" userId="6e4416676935328d" providerId="LiveId" clId="{10ADB0FA-12AB-49A0-A398-7B87A2DF4CCE}" dt="2023-09-16T07:58:08.772" v="48" actId="478"/>
+          <ac:spMkLst>
+            <pc:docMk/>
+            <pc:sldMk cId="339203755" sldId="261"/>
+            <ac:spMk id="20" creationId="{E57AD7CF-4B58-58E1-D620-A7E384866B5E}"/>
+          </ac:spMkLst>
+        </pc:spChg>
+        <pc:spChg chg="add del mod">
+          <ac:chgData name="Jeffrey Jose" userId="6e4416676935328d" providerId="LiveId" clId="{10ADB0FA-12AB-49A0-A398-7B87A2DF4CCE}" dt="2023-09-16T07:58:08.772" v="48" actId="478"/>
+          <ac:spMkLst>
+            <pc:docMk/>
+            <pc:sldMk cId="339203755" sldId="261"/>
+            <ac:spMk id="21" creationId="{9192D350-30B6-4F5C-DE73-40228208C20E}"/>
+          </ac:spMkLst>
+        </pc:spChg>
+        <pc:spChg chg="add del mod">
+          <ac:chgData name="Jeffrey Jose" userId="6e4416676935328d" providerId="LiveId" clId="{10ADB0FA-12AB-49A0-A398-7B87A2DF4CCE}" dt="2023-09-16T07:58:08.772" v="48" actId="478"/>
+          <ac:spMkLst>
+            <pc:docMk/>
+            <pc:sldMk cId="339203755" sldId="261"/>
+            <ac:spMk id="22" creationId="{DD3A53C5-E67D-822E-BF20-D2869E5580FD}"/>
+          </ac:spMkLst>
+        </pc:spChg>
+        <pc:spChg chg="add del mod">
+          <ac:chgData name="Jeffrey Jose" userId="6e4416676935328d" providerId="LiveId" clId="{10ADB0FA-12AB-49A0-A398-7B87A2DF4CCE}" dt="2023-09-16T07:58:08.772" v="48" actId="478"/>
+          <ac:spMkLst>
+            <pc:docMk/>
+            <pc:sldMk cId="339203755" sldId="261"/>
+            <ac:spMk id="23" creationId="{9DFDF7BD-16FB-8D31-12FF-7BC9C245D0CE}"/>
+          </ac:spMkLst>
+        </pc:spChg>
+        <pc:spChg chg="add mod">
+          <ac:chgData name="Jeffrey Jose" userId="6e4416676935328d" providerId="LiveId" clId="{10ADB0FA-12AB-49A0-A398-7B87A2DF4CCE}" dt="2023-09-16T08:26:23.241" v="819" actId="207"/>
+          <ac:spMkLst>
+            <pc:docMk/>
+            <pc:sldMk cId="339203755" sldId="261"/>
+            <ac:spMk id="24" creationId="{FADEBB8F-4712-F713-C5F9-BB175845DAD6}"/>
+          </ac:spMkLst>
+        </pc:spChg>
+        <pc:spChg chg="add mod">
+          <ac:chgData name="Jeffrey Jose" userId="6e4416676935328d" providerId="LiveId" clId="{10ADB0FA-12AB-49A0-A398-7B87A2DF4CCE}" dt="2023-09-16T08:26:35.140" v="820" actId="207"/>
+          <ac:spMkLst>
+            <pc:docMk/>
+            <pc:sldMk cId="339203755" sldId="261"/>
+            <ac:spMk id="25" creationId="{71D95EA4-2BDB-4593-E42B-4DA70846DC83}"/>
+          </ac:spMkLst>
+        </pc:spChg>
+        <pc:spChg chg="add mod">
+          <ac:chgData name="Jeffrey Jose" userId="6e4416676935328d" providerId="LiveId" clId="{10ADB0FA-12AB-49A0-A398-7B87A2DF4CCE}" dt="2023-09-16T08:27:03.262" v="822" actId="20577"/>
+          <ac:spMkLst>
+            <pc:docMk/>
+            <pc:sldMk cId="339203755" sldId="261"/>
+            <ac:spMk id="26" creationId="{FF3C6D0D-0BE8-9F1D-6821-623227AEDB5F}"/>
+          </ac:spMkLst>
+        </pc:spChg>
+        <pc:spChg chg="add mod">
+          <ac:chgData name="Jeffrey Jose" userId="6e4416676935328d" providerId="LiveId" clId="{10ADB0FA-12AB-49A0-A398-7B87A2DF4CCE}" dt="2023-09-16T08:27:11.585" v="823" actId="207"/>
+          <ac:spMkLst>
+            <pc:docMk/>
+            <pc:sldMk cId="339203755" sldId="261"/>
+            <ac:spMk id="27" creationId="{F3BA02BC-02BE-8B00-22DE-F8787364F777}"/>
+          </ac:spMkLst>
+        </pc:spChg>
+        <pc:spChg chg="add mod">
+          <ac:chgData name="Jeffrey Jose" userId="6e4416676935328d" providerId="LiveId" clId="{10ADB0FA-12AB-49A0-A398-7B87A2DF4CCE}" dt="2023-09-16T08:27:18.752" v="824" actId="207"/>
+          <ac:spMkLst>
+            <pc:docMk/>
+            <pc:sldMk cId="339203755" sldId="261"/>
+            <ac:spMk id="28" creationId="{E5FF3CE3-8CAA-5E4B-4C62-93A2635FEBE7}"/>
+          </ac:spMkLst>
+        </pc:spChg>
+        <pc:spChg chg="add mod">
+          <ac:chgData name="Jeffrey Jose" userId="6e4416676935328d" providerId="LiveId" clId="{10ADB0FA-12AB-49A0-A398-7B87A2DF4CCE}" dt="2023-09-16T08:27:26.182" v="825" actId="207"/>
+          <ac:spMkLst>
+            <pc:docMk/>
+            <pc:sldMk cId="339203755" sldId="261"/>
+            <ac:spMk id="29" creationId="{D3929CFC-3C60-A47E-3966-CD0785A400C2}"/>
+          </ac:spMkLst>
+        </pc:spChg>
+        <pc:spChg chg="add mod">
+          <ac:chgData name="Jeffrey Jose" userId="6e4416676935328d" providerId="LiveId" clId="{10ADB0FA-12AB-49A0-A398-7B87A2DF4CCE}" dt="2023-09-16T08:27:32.670" v="826" actId="207"/>
+          <ac:spMkLst>
+            <pc:docMk/>
+            <pc:sldMk cId="339203755" sldId="261"/>
+            <ac:spMk id="30" creationId="{B632F444-4426-9180-DDC3-850C87D7D384}"/>
+          </ac:spMkLst>
+        </pc:spChg>
+        <pc:spChg chg="add mod">
+          <ac:chgData name="Jeffrey Jose" userId="6e4416676935328d" providerId="LiveId" clId="{10ADB0FA-12AB-49A0-A398-7B87A2DF4CCE}" dt="2023-09-16T08:27:38.963" v="827" actId="207"/>
+          <ac:spMkLst>
+            <pc:docMk/>
+            <pc:sldMk cId="339203755" sldId="261"/>
+            <ac:spMk id="31" creationId="{46A4D3FC-FFEF-7438-1E21-6DE3EFB50072}"/>
+          </ac:spMkLst>
+        </pc:spChg>
+        <pc:spChg chg="add mod">
+          <ac:chgData name="Jeffrey Jose" userId="6e4416676935328d" providerId="LiveId" clId="{10ADB0FA-12AB-49A0-A398-7B87A2DF4CCE}" dt="2023-09-16T08:27:46.618" v="828" actId="207"/>
+          <ac:spMkLst>
+            <pc:docMk/>
+            <pc:sldMk cId="339203755" sldId="261"/>
+            <ac:spMk id="32" creationId="{77AB4781-3937-1D90-3650-2FB845FFD7E7}"/>
+          </ac:spMkLst>
+        </pc:spChg>
+        <pc:spChg chg="add mod">
+          <ac:chgData name="Jeffrey Jose" userId="6e4416676935328d" providerId="LiveId" clId="{10ADB0FA-12AB-49A0-A398-7B87A2DF4CCE}" dt="2023-09-16T08:29:13.770" v="842" actId="207"/>
+          <ac:spMkLst>
+            <pc:docMk/>
+            <pc:sldMk cId="339203755" sldId="261"/>
+            <ac:spMk id="33" creationId="{2F63DACC-4768-27FF-04AC-DB493C22CB85}"/>
+          </ac:spMkLst>
+        </pc:spChg>
+        <pc:spChg chg="add mod">
+          <ac:chgData name="Jeffrey Jose" userId="6e4416676935328d" providerId="LiveId" clId="{10ADB0FA-12AB-49A0-A398-7B87A2DF4CCE}" dt="2023-09-16T08:28:05.247" v="832" actId="207"/>
+          <ac:spMkLst>
+            <pc:docMk/>
+            <pc:sldMk cId="339203755" sldId="261"/>
+            <ac:spMk id="34" creationId="{07C3934F-42C4-C3DF-973C-EFD135112FD7}"/>
+          </ac:spMkLst>
+        </pc:spChg>
+        <pc:spChg chg="add mod">
+          <ac:chgData name="Jeffrey Jose" userId="6e4416676935328d" providerId="LiveId" clId="{10ADB0FA-12AB-49A0-A398-7B87A2DF4CCE}" dt="2023-09-16T08:28:12.647" v="833" actId="207"/>
+          <ac:spMkLst>
+            <pc:docMk/>
+            <pc:sldMk cId="339203755" sldId="261"/>
+            <ac:spMk id="35" creationId="{6C3A4B06-2730-0B4B-18DB-DA09A6D6974C}"/>
+          </ac:spMkLst>
+        </pc:spChg>
+        <pc:spChg chg="add mod">
+          <ac:chgData name="Jeffrey Jose" userId="6e4416676935328d" providerId="LiveId" clId="{10ADB0FA-12AB-49A0-A398-7B87A2DF4CCE}" dt="2023-09-16T08:28:19.055" v="834" actId="207"/>
+          <ac:spMkLst>
+            <pc:docMk/>
+            <pc:sldMk cId="339203755" sldId="261"/>
+            <ac:spMk id="36" creationId="{D2CD5A88-EF85-B921-5F0B-07E694CB8427}"/>
+          </ac:spMkLst>
+        </pc:spChg>
+        <pc:spChg chg="add mod">
+          <ac:chgData name="Jeffrey Jose" userId="6e4416676935328d" providerId="LiveId" clId="{10ADB0FA-12AB-49A0-A398-7B87A2DF4CCE}" dt="2023-09-16T08:28:25.763" v="835" actId="207"/>
+          <ac:spMkLst>
+            <pc:docMk/>
+            <pc:sldMk cId="339203755" sldId="261"/>
+            <ac:spMk id="37" creationId="{814B5543-1477-3557-63B2-DDE37B402665}"/>
+          </ac:spMkLst>
+        </pc:spChg>
+        <pc:spChg chg="add mod">
+          <ac:chgData name="Jeffrey Jose" userId="6e4416676935328d" providerId="LiveId" clId="{10ADB0FA-12AB-49A0-A398-7B87A2DF4CCE}" dt="2023-09-16T08:28:33.350" v="836" actId="207"/>
+          <ac:spMkLst>
+            <pc:docMk/>
+            <pc:sldMk cId="339203755" sldId="261"/>
+            <ac:spMk id="38" creationId="{D9D4F169-1256-A8C0-B05C-8514A4180758}"/>
+          </ac:spMkLst>
+        </pc:spChg>
+        <pc:spChg chg="add mod">
+          <ac:chgData name="Jeffrey Jose" userId="6e4416676935328d" providerId="LiveId" clId="{10ADB0FA-12AB-49A0-A398-7B87A2DF4CCE}" dt="2023-09-16T08:28:39.547" v="837" actId="207"/>
+          <ac:spMkLst>
+            <pc:docMk/>
+            <pc:sldMk cId="339203755" sldId="261"/>
+            <ac:spMk id="39" creationId="{1228339F-88C4-231D-3710-BA593C0C0F8D}"/>
+          </ac:spMkLst>
+        </pc:spChg>
+        <pc:spChg chg="add mod">
+          <ac:chgData name="Jeffrey Jose" userId="6e4416676935328d" providerId="LiveId" clId="{10ADB0FA-12AB-49A0-A398-7B87A2DF4CCE}" dt="2023-09-16T08:28:46.176" v="838" actId="207"/>
+          <ac:spMkLst>
+            <pc:docMk/>
+            <pc:sldMk cId="339203755" sldId="261"/>
+            <ac:spMk id="40" creationId="{4F3F89F5-AA1D-3069-BB4A-2326E444A582}"/>
+          </ac:spMkLst>
+        </pc:spChg>
+        <pc:spChg chg="add mod">
+          <ac:chgData name="Jeffrey Jose" userId="6e4416676935328d" providerId="LiveId" clId="{10ADB0FA-12AB-49A0-A398-7B87A2DF4CCE}" dt="2023-09-16T08:29:16.280" v="843" actId="207"/>
+          <ac:spMkLst>
+            <pc:docMk/>
+            <pc:sldMk cId="339203755" sldId="261"/>
+            <ac:spMk id="41" creationId="{490B524C-E1E7-C22A-D6C4-38673914879B}"/>
+          </ac:spMkLst>
+        </pc:spChg>
+        <pc:spChg chg="add mod">
+          <ac:chgData name="Jeffrey Jose" userId="6e4416676935328d" providerId="LiveId" clId="{10ADB0FA-12AB-49A0-A398-7B87A2DF4CCE}" dt="2023-09-16T08:28:59.844" v="840" actId="207"/>
+          <ac:spMkLst>
+            <pc:docMk/>
+            <pc:sldMk cId="339203755" sldId="261"/>
+            <ac:spMk id="42" creationId="{8A96B601-2CEA-437B-6654-D202134B6110}"/>
+          </ac:spMkLst>
+        </pc:spChg>
+        <pc:spChg chg="add mod">
+          <ac:chgData name="Jeffrey Jose" userId="6e4416676935328d" providerId="LiveId" clId="{10ADB0FA-12AB-49A0-A398-7B87A2DF4CCE}" dt="2023-09-16T08:29:07.831" v="841" actId="207"/>
+          <ac:spMkLst>
+            <pc:docMk/>
+            <pc:sldMk cId="339203755" sldId="261"/>
+            <ac:spMk id="43" creationId="{0E24A867-B399-8AAE-9455-986F1F2D4CCB}"/>
+          </ac:spMkLst>
+        </pc:spChg>
       </pc:sldChg>
     </pc:docChg>
   </pc:docChgLst>
@@ -339,7 +715,7 @@
           <a:p>
             <a:fld id="{262DC6FD-3767-4583-BFC9-BB4786788C22}" type="datetimeFigureOut">
               <a:rPr lang="en-NZ" smtClean="0"/>
-              <a:t>2/09/2023</a:t>
+              <a:t>16/09/2023</a:t>
             </a:fld>
             <a:endParaRPr lang="en-NZ"/>
           </a:p>
@@ -539,7 +915,7 @@
           <a:p>
             <a:fld id="{262DC6FD-3767-4583-BFC9-BB4786788C22}" type="datetimeFigureOut">
               <a:rPr lang="en-NZ" smtClean="0"/>
-              <a:t>2/09/2023</a:t>
+              <a:t>16/09/2023</a:t>
             </a:fld>
             <a:endParaRPr lang="en-NZ"/>
           </a:p>
@@ -749,7 +1125,7 @@
           <a:p>
             <a:fld id="{262DC6FD-3767-4583-BFC9-BB4786788C22}" type="datetimeFigureOut">
               <a:rPr lang="en-NZ" smtClean="0"/>
-              <a:t>2/09/2023</a:t>
+              <a:t>16/09/2023</a:t>
             </a:fld>
             <a:endParaRPr lang="en-NZ"/>
           </a:p>
@@ -949,7 +1325,7 @@
           <a:p>
             <a:fld id="{262DC6FD-3767-4583-BFC9-BB4786788C22}" type="datetimeFigureOut">
               <a:rPr lang="en-NZ" smtClean="0"/>
-              <a:t>2/09/2023</a:t>
+              <a:t>16/09/2023</a:t>
             </a:fld>
             <a:endParaRPr lang="en-NZ"/>
           </a:p>
@@ -1225,7 +1601,7 @@
           <a:p>
             <a:fld id="{262DC6FD-3767-4583-BFC9-BB4786788C22}" type="datetimeFigureOut">
               <a:rPr lang="en-NZ" smtClean="0"/>
-              <a:t>2/09/2023</a:t>
+              <a:t>16/09/2023</a:t>
             </a:fld>
             <a:endParaRPr lang="en-NZ"/>
           </a:p>
@@ -1493,7 +1869,7 @@
           <a:p>
             <a:fld id="{262DC6FD-3767-4583-BFC9-BB4786788C22}" type="datetimeFigureOut">
               <a:rPr lang="en-NZ" smtClean="0"/>
-              <a:t>2/09/2023</a:t>
+              <a:t>16/09/2023</a:t>
             </a:fld>
             <a:endParaRPr lang="en-NZ"/>
           </a:p>
@@ -1908,7 +2284,7 @@
           <a:p>
             <a:fld id="{262DC6FD-3767-4583-BFC9-BB4786788C22}" type="datetimeFigureOut">
               <a:rPr lang="en-NZ" smtClean="0"/>
-              <a:t>2/09/2023</a:t>
+              <a:t>16/09/2023</a:t>
             </a:fld>
             <a:endParaRPr lang="en-NZ"/>
           </a:p>
@@ -2050,7 +2426,7 @@
           <a:p>
             <a:fld id="{262DC6FD-3767-4583-BFC9-BB4786788C22}" type="datetimeFigureOut">
               <a:rPr lang="en-NZ" smtClean="0"/>
-              <a:t>2/09/2023</a:t>
+              <a:t>16/09/2023</a:t>
             </a:fld>
             <a:endParaRPr lang="en-NZ"/>
           </a:p>
@@ -2163,7 +2539,7 @@
           <a:p>
             <a:fld id="{262DC6FD-3767-4583-BFC9-BB4786788C22}" type="datetimeFigureOut">
               <a:rPr lang="en-NZ" smtClean="0"/>
-              <a:t>2/09/2023</a:t>
+              <a:t>16/09/2023</a:t>
             </a:fld>
             <a:endParaRPr lang="en-NZ"/>
           </a:p>
@@ -2476,7 +2852,7 @@
           <a:p>
             <a:fld id="{262DC6FD-3767-4583-BFC9-BB4786788C22}" type="datetimeFigureOut">
               <a:rPr lang="en-NZ" smtClean="0"/>
-              <a:t>2/09/2023</a:t>
+              <a:t>16/09/2023</a:t>
             </a:fld>
             <a:endParaRPr lang="en-NZ"/>
           </a:p>
@@ -2765,7 +3141,7 @@
           <a:p>
             <a:fld id="{262DC6FD-3767-4583-BFC9-BB4786788C22}" type="datetimeFigureOut">
               <a:rPr lang="en-NZ" smtClean="0"/>
-              <a:t>2/09/2023</a:t>
+              <a:t>16/09/2023</a:t>
             </a:fld>
             <a:endParaRPr lang="en-NZ"/>
           </a:p>
@@ -3008,7 +3384,7 @@
           <a:p>
             <a:fld id="{262DC6FD-3767-4583-BFC9-BB4786788C22}" type="datetimeFigureOut">
               <a:rPr lang="en-NZ" smtClean="0"/>
-              <a:t>2/09/2023</a:t>
+              <a:t>16/09/2023</a:t>
             </a:fld>
             <a:endParaRPr lang="en-NZ"/>
           </a:p>
@@ -4085,8 +4461,8 @@
         </p:nvSpPr>
         <p:spPr>
           <a:xfrm>
-            <a:off x="2506824" y="1001485"/>
-            <a:ext cx="9685176" cy="491413"/>
+            <a:off x="958516" y="1001485"/>
+            <a:ext cx="11233484" cy="491413"/>
           </a:xfrm>
           <a:prstGeom prst="rect">
             <a:avLst/>
@@ -4139,7 +4515,7 @@
         </p:nvSpPr>
         <p:spPr>
           <a:xfrm>
-            <a:off x="1161660" y="999930"/>
+            <a:off x="-386648" y="1001485"/>
             <a:ext cx="2690328" cy="1433805"/>
           </a:xfrm>
           <a:prstGeom prst="triangle">
@@ -4447,6 +4823,314 @@
         </p:nvSpPr>
         <p:spPr>
           <a:xfrm>
+            <a:off x="958516" y="1001485"/>
+            <a:ext cx="11233484" cy="491413"/>
+          </a:xfrm>
+          <a:prstGeom prst="rect">
+            <a:avLst/>
+          </a:prstGeom>
+          <a:solidFill>
+            <a:srgbClr val="37003C"/>
+          </a:solidFill>
+          <a:ln>
+            <a:solidFill>
+              <a:srgbClr val="37003C"/>
+            </a:solidFill>
+          </a:ln>
+        </p:spPr>
+        <p:style>
+          <a:lnRef idx="2">
+            <a:schemeClr val="accent1">
+              <a:shade val="15000"/>
+            </a:schemeClr>
+          </a:lnRef>
+          <a:fillRef idx="1">
+            <a:schemeClr val="accent1"/>
+          </a:fillRef>
+          <a:effectRef idx="0">
+            <a:schemeClr val="accent1"/>
+          </a:effectRef>
+          <a:fontRef idx="minor">
+            <a:schemeClr val="lt1"/>
+          </a:fontRef>
+        </p:style>
+        <p:txBody>
+          <a:bodyPr rtlCol="0" anchor="ctr"/>
+          <a:lstStyle/>
+          <a:p>
+            <a:pPr algn="ctr"/>
+            <a:endParaRPr lang="en-NZ"/>
+          </a:p>
+        </p:txBody>
+      </p:sp>
+      <p:sp>
+        <p:nvSpPr>
+          <p:cNvPr id="10" name="Isosceles Triangle 9">
+            <a:extLst>
+              <a:ext uri="{FF2B5EF4-FFF2-40B4-BE49-F238E27FC236}">
+                <a16:creationId xmlns:a16="http://schemas.microsoft.com/office/drawing/2014/main" id="{34F2997E-8337-76FA-2D89-52EDC479D7CC}"/>
+              </a:ext>
+            </a:extLst>
+          </p:cNvPr>
+          <p:cNvSpPr/>
+          <p:nvPr/>
+        </p:nvSpPr>
+        <p:spPr>
+          <a:xfrm>
+            <a:off x="-386648" y="1001485"/>
+            <a:ext cx="2690328" cy="1433805"/>
+          </a:xfrm>
+          <a:prstGeom prst="triangle">
+            <a:avLst/>
+          </a:prstGeom>
+          <a:solidFill>
+            <a:srgbClr val="FF005C"/>
+          </a:solidFill>
+          <a:ln>
+            <a:solidFill>
+              <a:srgbClr val="FF005C"/>
+            </a:solidFill>
+          </a:ln>
+        </p:spPr>
+        <p:style>
+          <a:lnRef idx="2">
+            <a:schemeClr val="accent1">
+              <a:shade val="15000"/>
+            </a:schemeClr>
+          </a:lnRef>
+          <a:fillRef idx="1">
+            <a:schemeClr val="accent1"/>
+          </a:fillRef>
+          <a:effectRef idx="0">
+            <a:schemeClr val="accent1"/>
+          </a:effectRef>
+          <a:fontRef idx="minor">
+            <a:schemeClr val="lt1"/>
+          </a:fontRef>
+        </p:style>
+        <p:txBody>
+          <a:bodyPr rtlCol="0" anchor="ctr"/>
+          <a:lstStyle/>
+          <a:p>
+            <a:pPr algn="ctr"/>
+            <a:endParaRPr lang="en-NZ"/>
+          </a:p>
+        </p:txBody>
+      </p:sp>
+      <p:sp>
+        <p:nvSpPr>
+          <p:cNvPr id="11" name="Isosceles Triangle 10">
+            <a:extLst>
+              <a:ext uri="{FF2B5EF4-FFF2-40B4-BE49-F238E27FC236}">
+                <a16:creationId xmlns:a16="http://schemas.microsoft.com/office/drawing/2014/main" id="{CF6AB740-0534-2D7F-339F-E466EF2A1AA4}"/>
+              </a:ext>
+            </a:extLst>
+          </p:cNvPr>
+          <p:cNvSpPr/>
+          <p:nvPr/>
+        </p:nvSpPr>
+        <p:spPr>
+          <a:xfrm>
+            <a:off x="8462865" y="83198"/>
+            <a:ext cx="2698103" cy="850640"/>
+          </a:xfrm>
+          <a:prstGeom prst="triangle">
+            <a:avLst/>
+          </a:prstGeom>
+          <a:solidFill>
+            <a:srgbClr val="FF005C"/>
+          </a:solidFill>
+          <a:ln>
+            <a:solidFill>
+              <a:srgbClr val="FF005C"/>
+            </a:solidFill>
+          </a:ln>
+        </p:spPr>
+        <p:style>
+          <a:lnRef idx="2">
+            <a:schemeClr val="accent1">
+              <a:shade val="15000"/>
+            </a:schemeClr>
+          </a:lnRef>
+          <a:fillRef idx="1">
+            <a:schemeClr val="accent1"/>
+          </a:fillRef>
+          <a:effectRef idx="0">
+            <a:schemeClr val="accent1"/>
+          </a:effectRef>
+          <a:fontRef idx="minor">
+            <a:schemeClr val="lt1"/>
+          </a:fontRef>
+        </p:style>
+        <p:txBody>
+          <a:bodyPr rtlCol="0" anchor="ctr"/>
+          <a:lstStyle/>
+          <a:p>
+            <a:pPr algn="ctr"/>
+            <a:endParaRPr lang="en-NZ"/>
+          </a:p>
+        </p:txBody>
+      </p:sp>
+      <p:sp>
+        <p:nvSpPr>
+          <p:cNvPr id="3" name="Isosceles Triangle 2">
+            <a:extLst>
+              <a:ext uri="{FF2B5EF4-FFF2-40B4-BE49-F238E27FC236}">
+                <a16:creationId xmlns:a16="http://schemas.microsoft.com/office/drawing/2014/main" id="{6F45ECE6-BF8D-4937-15F6-E7FC3D72BD16}"/>
+              </a:ext>
+            </a:extLst>
+          </p:cNvPr>
+          <p:cNvSpPr/>
+          <p:nvPr/>
+        </p:nvSpPr>
+        <p:spPr>
+          <a:xfrm>
+            <a:off x="8340014" y="1625081"/>
+            <a:ext cx="2690328" cy="1433805"/>
+          </a:xfrm>
+          <a:prstGeom prst="triangle">
+            <a:avLst/>
+          </a:prstGeom>
+          <a:solidFill>
+            <a:srgbClr val="FF005C"/>
+          </a:solidFill>
+          <a:ln>
+            <a:solidFill>
+              <a:srgbClr val="FF005C"/>
+            </a:solidFill>
+          </a:ln>
+        </p:spPr>
+        <p:style>
+          <a:lnRef idx="2">
+            <a:schemeClr val="accent1">
+              <a:shade val="15000"/>
+            </a:schemeClr>
+          </a:lnRef>
+          <a:fillRef idx="1">
+            <a:schemeClr val="accent1"/>
+          </a:fillRef>
+          <a:effectRef idx="0">
+            <a:schemeClr val="accent1"/>
+          </a:effectRef>
+          <a:fontRef idx="minor">
+            <a:schemeClr val="lt1"/>
+          </a:fontRef>
+        </p:style>
+        <p:txBody>
+          <a:bodyPr rtlCol="0" anchor="ctr"/>
+          <a:lstStyle/>
+          <a:p>
+            <a:pPr algn="ctr"/>
+            <a:endParaRPr lang="en-NZ"/>
+          </a:p>
+        </p:txBody>
+      </p:sp>
+    </p:spTree>
+    <p:extLst>
+      <p:ext uri="{BB962C8B-B14F-4D97-AF65-F5344CB8AC3E}">
+        <p14:creationId xmlns:p14="http://schemas.microsoft.com/office/powerpoint/2010/main" val="2902817804"/>
+      </p:ext>
+    </p:extLst>
+  </p:cSld>
+  <p:clrMapOvr>
+    <a:masterClrMapping/>
+  </p:clrMapOvr>
+</p:sld>
+</file>
+
+<file path=ppt/slides/slide5.xml><?xml version="1.0" encoding="utf-8"?>
+<p:sld xmlns:a="http://schemas.openxmlformats.org/drawingml/2006/main" xmlns:r="http://schemas.openxmlformats.org/officeDocument/2006/relationships" xmlns:p="http://schemas.openxmlformats.org/presentationml/2006/main">
+  <p:cSld>
+    <p:bg>
+      <p:bgPr>
+        <a:solidFill>
+          <a:srgbClr val="FF005C"/>
+        </a:solidFill>
+        <a:effectLst/>
+      </p:bgPr>
+    </p:bg>
+    <p:spTree>
+      <p:nvGrpSpPr>
+        <p:cNvPr id="1" name=""/>
+        <p:cNvGrpSpPr/>
+        <p:nvPr/>
+      </p:nvGrpSpPr>
+      <p:grpSpPr>
+        <a:xfrm>
+          <a:off x="0" y="0"/>
+          <a:ext cx="0" cy="0"/>
+          <a:chOff x="0" y="0"/>
+          <a:chExt cx="0" cy="0"/>
+        </a:xfrm>
+      </p:grpSpPr>
+      <p:sp>
+        <p:nvSpPr>
+          <p:cNvPr id="8" name="Rectangle 7">
+            <a:extLst>
+              <a:ext uri="{FF2B5EF4-FFF2-40B4-BE49-F238E27FC236}">
+                <a16:creationId xmlns:a16="http://schemas.microsoft.com/office/drawing/2014/main" id="{D760365A-5D30-822A-AEEF-0DF1CB63C00D}"/>
+              </a:ext>
+            </a:extLst>
+          </p:cNvPr>
+          <p:cNvSpPr/>
+          <p:nvPr/>
+        </p:nvSpPr>
+        <p:spPr>
+          <a:xfrm>
+            <a:off x="-9331" y="149290"/>
+            <a:ext cx="9685176" cy="718457"/>
+          </a:xfrm>
+          <a:prstGeom prst="rect">
+            <a:avLst/>
+          </a:prstGeom>
+          <a:solidFill>
+            <a:srgbClr val="37003C"/>
+          </a:solidFill>
+          <a:ln>
+            <a:solidFill>
+              <a:srgbClr val="37003C"/>
+            </a:solidFill>
+          </a:ln>
+        </p:spPr>
+        <p:style>
+          <a:lnRef idx="2">
+            <a:schemeClr val="accent1">
+              <a:shade val="15000"/>
+            </a:schemeClr>
+          </a:lnRef>
+          <a:fillRef idx="1">
+            <a:schemeClr val="accent1"/>
+          </a:fillRef>
+          <a:effectRef idx="0">
+            <a:schemeClr val="accent1"/>
+          </a:effectRef>
+          <a:fontRef idx="minor">
+            <a:schemeClr val="lt1"/>
+          </a:fontRef>
+        </p:style>
+        <p:txBody>
+          <a:bodyPr rtlCol="0" anchor="ctr"/>
+          <a:lstStyle/>
+          <a:p>
+            <a:pPr algn="ctr"/>
+            <a:endParaRPr lang="en-NZ"/>
+          </a:p>
+        </p:txBody>
+      </p:sp>
+      <p:sp>
+        <p:nvSpPr>
+          <p:cNvPr id="9" name="Rectangle 8">
+            <a:extLst>
+              <a:ext uri="{FF2B5EF4-FFF2-40B4-BE49-F238E27FC236}">
+                <a16:creationId xmlns:a16="http://schemas.microsoft.com/office/drawing/2014/main" id="{36C2724A-FF6F-6DC2-3EA8-3CBC888DB530}"/>
+              </a:ext>
+            </a:extLst>
+          </p:cNvPr>
+          <p:cNvSpPr/>
+          <p:nvPr/>
+        </p:nvSpPr>
+        <p:spPr>
+          <a:xfrm>
             <a:off x="2506824" y="1001485"/>
             <a:ext cx="9685176" cy="491413"/>
           </a:xfrm>
@@ -4823,6 +5507,1425 @@
     <p:extLst>
       <p:ext uri="{BB962C8B-B14F-4D97-AF65-F5344CB8AC3E}">
         <p14:creationId xmlns:p14="http://schemas.microsoft.com/office/powerpoint/2010/main" val="1381194071"/>
+      </p:ext>
+    </p:extLst>
+  </p:cSld>
+  <p:clrMapOvr>
+    <a:masterClrMapping/>
+  </p:clrMapOvr>
+</p:sld>
+</file>
+
+<file path=ppt/slides/slide6.xml><?xml version="1.0" encoding="utf-8"?>
+<p:sld xmlns:a="http://schemas.openxmlformats.org/drawingml/2006/main" xmlns:r="http://schemas.openxmlformats.org/officeDocument/2006/relationships" xmlns:p="http://schemas.openxmlformats.org/presentationml/2006/main">
+  <p:cSld>
+    <p:spTree>
+      <p:nvGrpSpPr>
+        <p:cNvPr id="1" name=""/>
+        <p:cNvGrpSpPr/>
+        <p:nvPr/>
+      </p:nvGrpSpPr>
+      <p:grpSpPr>
+        <a:xfrm>
+          <a:off x="0" y="0"/>
+          <a:ext cx="0" cy="0"/>
+          <a:chOff x="0" y="0"/>
+          <a:chExt cx="0" cy="0"/>
+        </a:xfrm>
+      </p:grpSpPr>
+      <p:sp>
+        <p:nvSpPr>
+          <p:cNvPr id="24" name="Rectangle 23">
+            <a:extLst>
+              <a:ext uri="{FF2B5EF4-FFF2-40B4-BE49-F238E27FC236}">
+                <a16:creationId xmlns:a16="http://schemas.microsoft.com/office/drawing/2014/main" id="{FADEBB8F-4712-F713-C5F9-BB175845DAD6}"/>
+              </a:ext>
+            </a:extLst>
+          </p:cNvPr>
+          <p:cNvSpPr/>
+          <p:nvPr/>
+        </p:nvSpPr>
+        <p:spPr>
+          <a:xfrm>
+            <a:off x="28697" y="551214"/>
+            <a:ext cx="2325585" cy="1191491"/>
+          </a:xfrm>
+          <a:prstGeom prst="rect">
+            <a:avLst/>
+          </a:prstGeom>
+          <a:solidFill>
+            <a:srgbClr val="F10104"/>
+          </a:solidFill>
+        </p:spPr>
+        <p:style>
+          <a:lnRef idx="2">
+            <a:schemeClr val="accent1">
+              <a:shade val="15000"/>
+            </a:schemeClr>
+          </a:lnRef>
+          <a:fillRef idx="1">
+            <a:schemeClr val="accent1"/>
+          </a:fillRef>
+          <a:effectRef idx="0">
+            <a:schemeClr val="accent1"/>
+          </a:effectRef>
+          <a:fontRef idx="minor">
+            <a:schemeClr val="lt1"/>
+          </a:fontRef>
+        </p:style>
+        <p:txBody>
+          <a:bodyPr rtlCol="0" anchor="ctr"/>
+          <a:lstStyle/>
+          <a:p>
+            <a:pPr algn="ctr"/>
+            <a:r>
+              <a:rPr lang="en-US" dirty="0"/>
+              <a:t>Arsenal FC</a:t>
+            </a:r>
+          </a:p>
+          <a:p>
+            <a:pPr algn="ctr"/>
+            <a:r>
+              <a:rPr lang="en-NZ" dirty="0"/>
+              <a:t>#F10104</a:t>
+            </a:r>
+            <a:endParaRPr lang="en-US" dirty="0"/>
+          </a:p>
+          <a:p>
+            <a:pPr algn="ctr"/>
+            <a:r>
+              <a:rPr lang="en-US" dirty="0"/>
+              <a:t>RGB(241, 1, 4)</a:t>
+            </a:r>
+            <a:endParaRPr lang="en-NZ" dirty="0"/>
+          </a:p>
+        </p:txBody>
+      </p:sp>
+      <p:sp>
+        <p:nvSpPr>
+          <p:cNvPr id="25" name="Rectangle 24">
+            <a:extLst>
+              <a:ext uri="{FF2B5EF4-FFF2-40B4-BE49-F238E27FC236}">
+                <a16:creationId xmlns:a16="http://schemas.microsoft.com/office/drawing/2014/main" id="{71D95EA4-2BDB-4593-E42B-4DA70846DC83}"/>
+              </a:ext>
+            </a:extLst>
+          </p:cNvPr>
+          <p:cNvSpPr/>
+          <p:nvPr/>
+        </p:nvSpPr>
+        <p:spPr>
+          <a:xfrm>
+            <a:off x="2480952" y="551213"/>
+            <a:ext cx="2325585" cy="1191491"/>
+          </a:xfrm>
+          <a:prstGeom prst="rect">
+            <a:avLst/>
+          </a:prstGeom>
+          <a:solidFill>
+            <a:srgbClr val="851547"/>
+          </a:solidFill>
+        </p:spPr>
+        <p:style>
+          <a:lnRef idx="2">
+            <a:schemeClr val="accent1">
+              <a:shade val="15000"/>
+            </a:schemeClr>
+          </a:lnRef>
+          <a:fillRef idx="1">
+            <a:schemeClr val="accent1"/>
+          </a:fillRef>
+          <a:effectRef idx="0">
+            <a:schemeClr val="accent1"/>
+          </a:effectRef>
+          <a:fontRef idx="minor">
+            <a:schemeClr val="lt1"/>
+          </a:fontRef>
+        </p:style>
+        <p:txBody>
+          <a:bodyPr rtlCol="0" anchor="ctr"/>
+          <a:lstStyle/>
+          <a:p>
+            <a:pPr algn="ctr"/>
+            <a:r>
+              <a:rPr lang="en-US" dirty="0"/>
+              <a:t>Aston Villa</a:t>
+            </a:r>
+            <a:br>
+              <a:rPr lang="en-US" dirty="0"/>
+            </a:br>
+            <a:r>
+              <a:rPr lang="en-US" dirty="0"/>
+              <a:t>#851547</a:t>
+            </a:r>
+            <a:br>
+              <a:rPr lang="en-US" dirty="0"/>
+            </a:br>
+            <a:r>
+              <a:rPr lang="en-US" dirty="0"/>
+              <a:t>RGB(133, 21, 71)</a:t>
+            </a:r>
+            <a:endParaRPr lang="en-NZ" dirty="0"/>
+          </a:p>
+        </p:txBody>
+      </p:sp>
+      <p:sp>
+        <p:nvSpPr>
+          <p:cNvPr id="26" name="Rectangle 25">
+            <a:extLst>
+              <a:ext uri="{FF2B5EF4-FFF2-40B4-BE49-F238E27FC236}">
+                <a16:creationId xmlns:a16="http://schemas.microsoft.com/office/drawing/2014/main" id="{FF3C6D0D-0BE8-9F1D-6821-623227AEDB5F}"/>
+              </a:ext>
+            </a:extLst>
+          </p:cNvPr>
+          <p:cNvSpPr/>
+          <p:nvPr/>
+        </p:nvSpPr>
+        <p:spPr>
+          <a:xfrm>
+            <a:off x="4933207" y="551213"/>
+            <a:ext cx="2325585" cy="1191491"/>
+          </a:xfrm>
+          <a:prstGeom prst="rect">
+            <a:avLst/>
+          </a:prstGeom>
+          <a:solidFill>
+            <a:srgbClr val="BB1118"/>
+          </a:solidFill>
+        </p:spPr>
+        <p:style>
+          <a:lnRef idx="2">
+            <a:schemeClr val="accent1">
+              <a:shade val="15000"/>
+            </a:schemeClr>
+          </a:lnRef>
+          <a:fillRef idx="1">
+            <a:schemeClr val="accent1"/>
+          </a:fillRef>
+          <a:effectRef idx="0">
+            <a:schemeClr val="accent1"/>
+          </a:effectRef>
+          <a:fontRef idx="minor">
+            <a:schemeClr val="lt1"/>
+          </a:fontRef>
+        </p:style>
+        <p:txBody>
+          <a:bodyPr rtlCol="0" anchor="ctr"/>
+          <a:lstStyle/>
+          <a:p>
+            <a:pPr algn="ctr"/>
+            <a:r>
+              <a:rPr lang="en-US" dirty="0"/>
+              <a:t>AFC Bournemouth</a:t>
+            </a:r>
+            <a:br>
+              <a:rPr lang="en-US" dirty="0"/>
+            </a:br>
+            <a:r>
+              <a:rPr lang="en-US" dirty="0"/>
+              <a:t>#BB1118</a:t>
+            </a:r>
+            <a:br>
+              <a:rPr lang="en-US" dirty="0"/>
+            </a:br>
+            <a:r>
+              <a:rPr lang="en-US" dirty="0"/>
+              <a:t>RGB(187, 17, 24)</a:t>
+            </a:r>
+            <a:endParaRPr lang="en-NZ" dirty="0"/>
+          </a:p>
+        </p:txBody>
+      </p:sp>
+      <p:sp>
+        <p:nvSpPr>
+          <p:cNvPr id="27" name="Rectangle 26">
+            <a:extLst>
+              <a:ext uri="{FF2B5EF4-FFF2-40B4-BE49-F238E27FC236}">
+                <a16:creationId xmlns:a16="http://schemas.microsoft.com/office/drawing/2014/main" id="{F3BA02BC-02BE-8B00-22DE-F8787364F777}"/>
+              </a:ext>
+            </a:extLst>
+          </p:cNvPr>
+          <p:cNvSpPr/>
+          <p:nvPr/>
+        </p:nvSpPr>
+        <p:spPr>
+          <a:xfrm>
+            <a:off x="7385462" y="551213"/>
+            <a:ext cx="2325585" cy="1191491"/>
+          </a:xfrm>
+          <a:prstGeom prst="rect">
+            <a:avLst/>
+          </a:prstGeom>
+          <a:solidFill>
+            <a:srgbClr val="F81920"/>
+          </a:solidFill>
+        </p:spPr>
+        <p:style>
+          <a:lnRef idx="2">
+            <a:schemeClr val="accent1">
+              <a:shade val="15000"/>
+            </a:schemeClr>
+          </a:lnRef>
+          <a:fillRef idx="1">
+            <a:schemeClr val="accent1"/>
+          </a:fillRef>
+          <a:effectRef idx="0">
+            <a:schemeClr val="accent1"/>
+          </a:effectRef>
+          <a:fontRef idx="minor">
+            <a:schemeClr val="lt1"/>
+          </a:fontRef>
+        </p:style>
+        <p:txBody>
+          <a:bodyPr rtlCol="0" anchor="ctr"/>
+          <a:lstStyle/>
+          <a:p>
+            <a:pPr algn="ctr"/>
+            <a:r>
+              <a:rPr lang="en-US" dirty="0"/>
+              <a:t>Brentford FC</a:t>
+            </a:r>
+            <a:br>
+              <a:rPr lang="en-US" dirty="0"/>
+            </a:br>
+            <a:r>
+              <a:rPr lang="en-US" dirty="0"/>
+              <a:t>#F81920</a:t>
+            </a:r>
+            <a:br>
+              <a:rPr lang="en-US" dirty="0"/>
+            </a:br>
+            <a:r>
+              <a:rPr lang="en-US" dirty="0"/>
+              <a:t>RGB(248, 25, 32)</a:t>
+            </a:r>
+            <a:endParaRPr lang="en-NZ" dirty="0"/>
+          </a:p>
+        </p:txBody>
+      </p:sp>
+      <p:sp>
+        <p:nvSpPr>
+          <p:cNvPr id="28" name="Rectangle 27">
+            <a:extLst>
+              <a:ext uri="{FF2B5EF4-FFF2-40B4-BE49-F238E27FC236}">
+                <a16:creationId xmlns:a16="http://schemas.microsoft.com/office/drawing/2014/main" id="{E5FF3CE3-8CAA-5E4B-4C62-93A2635FEBE7}"/>
+              </a:ext>
+            </a:extLst>
+          </p:cNvPr>
+          <p:cNvSpPr/>
+          <p:nvPr/>
+        </p:nvSpPr>
+        <p:spPr>
+          <a:xfrm>
+            <a:off x="9837717" y="551213"/>
+            <a:ext cx="2325585" cy="1191491"/>
+          </a:xfrm>
+          <a:prstGeom prst="rect">
+            <a:avLst/>
+          </a:prstGeom>
+          <a:solidFill>
+            <a:srgbClr val="045AAE"/>
+          </a:solidFill>
+        </p:spPr>
+        <p:style>
+          <a:lnRef idx="2">
+            <a:schemeClr val="accent1">
+              <a:shade val="15000"/>
+            </a:schemeClr>
+          </a:lnRef>
+          <a:fillRef idx="1">
+            <a:schemeClr val="accent1"/>
+          </a:fillRef>
+          <a:effectRef idx="0">
+            <a:schemeClr val="accent1"/>
+          </a:effectRef>
+          <a:fontRef idx="minor">
+            <a:schemeClr val="lt1"/>
+          </a:fontRef>
+        </p:style>
+        <p:txBody>
+          <a:bodyPr rtlCol="0" anchor="ctr"/>
+          <a:lstStyle/>
+          <a:p>
+            <a:pPr algn="ctr"/>
+            <a:r>
+              <a:rPr lang="en-US" dirty="0"/>
+              <a:t>Brighton &amp; Hove Albion</a:t>
+            </a:r>
+            <a:br>
+              <a:rPr lang="en-US" dirty="0"/>
+            </a:br>
+            <a:r>
+              <a:rPr lang="en-US" dirty="0"/>
+              <a:t>#045AAE</a:t>
+            </a:r>
+            <a:br>
+              <a:rPr lang="en-US" dirty="0"/>
+            </a:br>
+            <a:r>
+              <a:rPr lang="en-US" dirty="0"/>
+              <a:t>RGB(4, 90, 174)</a:t>
+            </a:r>
+            <a:endParaRPr lang="en-NZ" dirty="0"/>
+          </a:p>
+        </p:txBody>
+      </p:sp>
+      <p:sp>
+        <p:nvSpPr>
+          <p:cNvPr id="29" name="Rectangle 28">
+            <a:extLst>
+              <a:ext uri="{FF2B5EF4-FFF2-40B4-BE49-F238E27FC236}">
+                <a16:creationId xmlns:a16="http://schemas.microsoft.com/office/drawing/2014/main" id="{D3929CFC-3C60-A47E-3966-CD0785A400C2}"/>
+              </a:ext>
+            </a:extLst>
+          </p:cNvPr>
+          <p:cNvSpPr/>
+          <p:nvPr/>
+        </p:nvSpPr>
+        <p:spPr>
+          <a:xfrm>
+            <a:off x="28697" y="1831770"/>
+            <a:ext cx="2325585" cy="1191491"/>
+          </a:xfrm>
+          <a:prstGeom prst="rect">
+            <a:avLst/>
+          </a:prstGeom>
+          <a:solidFill>
+            <a:srgbClr val="59062B"/>
+          </a:solidFill>
+        </p:spPr>
+        <p:style>
+          <a:lnRef idx="2">
+            <a:schemeClr val="accent1">
+              <a:shade val="15000"/>
+            </a:schemeClr>
+          </a:lnRef>
+          <a:fillRef idx="1">
+            <a:schemeClr val="accent1"/>
+          </a:fillRef>
+          <a:effectRef idx="0">
+            <a:schemeClr val="accent1"/>
+          </a:effectRef>
+          <a:fontRef idx="minor">
+            <a:schemeClr val="lt1"/>
+          </a:fontRef>
+        </p:style>
+        <p:txBody>
+          <a:bodyPr rtlCol="0" anchor="ctr"/>
+          <a:lstStyle/>
+          <a:p>
+            <a:pPr algn="ctr"/>
+            <a:r>
+              <a:rPr lang="en-US" dirty="0"/>
+              <a:t>Burnley FC</a:t>
+            </a:r>
+            <a:br>
+              <a:rPr lang="en-US" dirty="0"/>
+            </a:br>
+            <a:r>
+              <a:rPr lang="en-US" dirty="0"/>
+              <a:t>#59062B</a:t>
+            </a:r>
+            <a:br>
+              <a:rPr lang="en-US" dirty="0"/>
+            </a:br>
+            <a:r>
+              <a:rPr lang="en-US" dirty="0"/>
+              <a:t>RGB(89, 6, 43)</a:t>
+            </a:r>
+            <a:endParaRPr lang="en-NZ" dirty="0"/>
+          </a:p>
+        </p:txBody>
+      </p:sp>
+      <p:sp>
+        <p:nvSpPr>
+          <p:cNvPr id="30" name="Rectangle 29">
+            <a:extLst>
+              <a:ext uri="{FF2B5EF4-FFF2-40B4-BE49-F238E27FC236}">
+                <a16:creationId xmlns:a16="http://schemas.microsoft.com/office/drawing/2014/main" id="{B632F444-4426-9180-DDC3-850C87D7D384}"/>
+              </a:ext>
+            </a:extLst>
+          </p:cNvPr>
+          <p:cNvSpPr/>
+          <p:nvPr/>
+        </p:nvSpPr>
+        <p:spPr>
+          <a:xfrm>
+            <a:off x="2480952" y="1831769"/>
+            <a:ext cx="2325585" cy="1191491"/>
+          </a:xfrm>
+          <a:prstGeom prst="rect">
+            <a:avLst/>
+          </a:prstGeom>
+          <a:solidFill>
+            <a:srgbClr val="1A37C9"/>
+          </a:solidFill>
+        </p:spPr>
+        <p:style>
+          <a:lnRef idx="2">
+            <a:schemeClr val="accent1">
+              <a:shade val="15000"/>
+            </a:schemeClr>
+          </a:lnRef>
+          <a:fillRef idx="1">
+            <a:schemeClr val="accent1"/>
+          </a:fillRef>
+          <a:effectRef idx="0">
+            <a:schemeClr val="accent1"/>
+          </a:effectRef>
+          <a:fontRef idx="minor">
+            <a:schemeClr val="lt1"/>
+          </a:fontRef>
+        </p:style>
+        <p:txBody>
+          <a:bodyPr rtlCol="0" anchor="ctr"/>
+          <a:lstStyle/>
+          <a:p>
+            <a:pPr algn="ctr"/>
+            <a:r>
+              <a:rPr lang="en-US" dirty="0"/>
+              <a:t>Chelsea FC</a:t>
+            </a:r>
+            <a:br>
+              <a:rPr lang="en-US" dirty="0"/>
+            </a:br>
+            <a:r>
+              <a:rPr lang="en-US" dirty="0"/>
+              <a:t>#1A37C9</a:t>
+            </a:r>
+            <a:br>
+              <a:rPr lang="en-US" dirty="0"/>
+            </a:br>
+            <a:r>
+              <a:rPr lang="en-US" dirty="0"/>
+              <a:t>RGB(26, 55, 201)</a:t>
+            </a:r>
+            <a:endParaRPr lang="en-NZ" dirty="0"/>
+          </a:p>
+        </p:txBody>
+      </p:sp>
+      <p:sp>
+        <p:nvSpPr>
+          <p:cNvPr id="31" name="Rectangle 30">
+            <a:extLst>
+              <a:ext uri="{FF2B5EF4-FFF2-40B4-BE49-F238E27FC236}">
+                <a16:creationId xmlns:a16="http://schemas.microsoft.com/office/drawing/2014/main" id="{46A4D3FC-FFEF-7438-1E21-6DE3EFB50072}"/>
+              </a:ext>
+            </a:extLst>
+          </p:cNvPr>
+          <p:cNvSpPr/>
+          <p:nvPr/>
+        </p:nvSpPr>
+        <p:spPr>
+          <a:xfrm>
+            <a:off x="4933207" y="1831769"/>
+            <a:ext cx="2325585" cy="1191491"/>
+          </a:xfrm>
+          <a:prstGeom prst="rect">
+            <a:avLst/>
+          </a:prstGeom>
+          <a:solidFill>
+            <a:srgbClr val="0D5AB3"/>
+          </a:solidFill>
+        </p:spPr>
+        <p:style>
+          <a:lnRef idx="2">
+            <a:schemeClr val="accent1">
+              <a:shade val="15000"/>
+            </a:schemeClr>
+          </a:lnRef>
+          <a:fillRef idx="1">
+            <a:schemeClr val="accent1"/>
+          </a:fillRef>
+          <a:effectRef idx="0">
+            <a:schemeClr val="accent1"/>
+          </a:effectRef>
+          <a:fontRef idx="minor">
+            <a:schemeClr val="lt1"/>
+          </a:fontRef>
+        </p:style>
+        <p:txBody>
+          <a:bodyPr rtlCol="0" anchor="ctr"/>
+          <a:lstStyle/>
+          <a:p>
+            <a:pPr algn="ctr"/>
+            <a:r>
+              <a:rPr lang="en-US" dirty="0"/>
+              <a:t>Crystal Palace</a:t>
+            </a:r>
+            <a:br>
+              <a:rPr lang="en-US" dirty="0"/>
+            </a:br>
+            <a:r>
+              <a:rPr lang="en-US" dirty="0"/>
+              <a:t>#0D5AB3</a:t>
+            </a:r>
+            <a:br>
+              <a:rPr lang="en-US" dirty="0"/>
+            </a:br>
+            <a:r>
+              <a:rPr lang="en-US" dirty="0"/>
+              <a:t>RGB(13, 90, 179)</a:t>
+            </a:r>
+            <a:endParaRPr lang="en-NZ" dirty="0"/>
+          </a:p>
+        </p:txBody>
+      </p:sp>
+      <p:sp>
+        <p:nvSpPr>
+          <p:cNvPr id="32" name="Rectangle 31">
+            <a:extLst>
+              <a:ext uri="{FF2B5EF4-FFF2-40B4-BE49-F238E27FC236}">
+                <a16:creationId xmlns:a16="http://schemas.microsoft.com/office/drawing/2014/main" id="{77AB4781-3937-1D90-3650-2FB845FFD7E7}"/>
+              </a:ext>
+            </a:extLst>
+          </p:cNvPr>
+          <p:cNvSpPr/>
+          <p:nvPr/>
+        </p:nvSpPr>
+        <p:spPr>
+          <a:xfrm>
+            <a:off x="7385462" y="1831769"/>
+            <a:ext cx="2325585" cy="1191491"/>
+          </a:xfrm>
+          <a:prstGeom prst="rect">
+            <a:avLst/>
+          </a:prstGeom>
+          <a:solidFill>
+            <a:srgbClr val="0A0BA2"/>
+          </a:solidFill>
+        </p:spPr>
+        <p:style>
+          <a:lnRef idx="2">
+            <a:schemeClr val="accent1">
+              <a:shade val="15000"/>
+            </a:schemeClr>
+          </a:lnRef>
+          <a:fillRef idx="1">
+            <a:schemeClr val="accent1"/>
+          </a:fillRef>
+          <a:effectRef idx="0">
+            <a:schemeClr val="accent1"/>
+          </a:effectRef>
+          <a:fontRef idx="minor">
+            <a:schemeClr val="lt1"/>
+          </a:fontRef>
+        </p:style>
+        <p:txBody>
+          <a:bodyPr rtlCol="0" anchor="ctr"/>
+          <a:lstStyle/>
+          <a:p>
+            <a:pPr algn="ctr"/>
+            <a:r>
+              <a:rPr lang="en-US" dirty="0"/>
+              <a:t>Everton FC</a:t>
+            </a:r>
+            <a:br>
+              <a:rPr lang="en-US" dirty="0"/>
+            </a:br>
+            <a:r>
+              <a:rPr lang="en-US" dirty="0"/>
+              <a:t>#0A0BA2</a:t>
+            </a:r>
+            <a:br>
+              <a:rPr lang="en-US" dirty="0"/>
+            </a:br>
+            <a:r>
+              <a:rPr lang="en-US" dirty="0"/>
+              <a:t>RGB(10, 11, 162)</a:t>
+            </a:r>
+            <a:endParaRPr lang="en-NZ" dirty="0"/>
+          </a:p>
+        </p:txBody>
+      </p:sp>
+      <p:sp>
+        <p:nvSpPr>
+          <p:cNvPr id="33" name="Rectangle 32">
+            <a:extLst>
+              <a:ext uri="{FF2B5EF4-FFF2-40B4-BE49-F238E27FC236}">
+                <a16:creationId xmlns:a16="http://schemas.microsoft.com/office/drawing/2014/main" id="{2F63DACC-4768-27FF-04AC-DB493C22CB85}"/>
+              </a:ext>
+            </a:extLst>
+          </p:cNvPr>
+          <p:cNvSpPr/>
+          <p:nvPr/>
+        </p:nvSpPr>
+        <p:spPr>
+          <a:xfrm>
+            <a:off x="9837717" y="1831769"/>
+            <a:ext cx="2325585" cy="1191491"/>
+          </a:xfrm>
+          <a:prstGeom prst="rect">
+            <a:avLst/>
+          </a:prstGeom>
+          <a:solidFill>
+            <a:srgbClr val="F8F8F8"/>
+          </a:solidFill>
+        </p:spPr>
+        <p:style>
+          <a:lnRef idx="2">
+            <a:schemeClr val="accent1">
+              <a:shade val="15000"/>
+            </a:schemeClr>
+          </a:lnRef>
+          <a:fillRef idx="1">
+            <a:schemeClr val="accent1"/>
+          </a:fillRef>
+          <a:effectRef idx="0">
+            <a:schemeClr val="accent1"/>
+          </a:effectRef>
+          <a:fontRef idx="minor">
+            <a:schemeClr val="lt1"/>
+          </a:fontRef>
+        </p:style>
+        <p:txBody>
+          <a:bodyPr rtlCol="0" anchor="ctr"/>
+          <a:lstStyle/>
+          <a:p>
+            <a:pPr algn="ctr"/>
+            <a:r>
+              <a:rPr lang="en-US" dirty="0">
+                <a:solidFill>
+                  <a:schemeClr val="tx1"/>
+                </a:solidFill>
+              </a:rPr>
+              <a:t>Fulham FC</a:t>
+            </a:r>
+            <a:br>
+              <a:rPr lang="en-US" dirty="0">
+                <a:solidFill>
+                  <a:schemeClr val="tx1"/>
+                </a:solidFill>
+              </a:rPr>
+            </a:br>
+            <a:r>
+              <a:rPr lang="en-US" dirty="0">
+                <a:solidFill>
+                  <a:schemeClr val="tx1"/>
+                </a:solidFill>
+              </a:rPr>
+              <a:t>#F8F8F8</a:t>
+            </a:r>
+            <a:br>
+              <a:rPr lang="en-US" dirty="0">
+                <a:solidFill>
+                  <a:schemeClr val="tx1"/>
+                </a:solidFill>
+              </a:rPr>
+            </a:br>
+            <a:r>
+              <a:rPr lang="en-US" dirty="0">
+                <a:solidFill>
+                  <a:schemeClr val="tx1"/>
+                </a:solidFill>
+              </a:rPr>
+              <a:t>RGB(248, 248, 248)</a:t>
+            </a:r>
+            <a:endParaRPr lang="en-NZ" dirty="0">
+              <a:solidFill>
+                <a:schemeClr val="tx1"/>
+              </a:solidFill>
+            </a:endParaRPr>
+          </a:p>
+        </p:txBody>
+      </p:sp>
+      <p:sp>
+        <p:nvSpPr>
+          <p:cNvPr id="34" name="Rectangle 33">
+            <a:extLst>
+              <a:ext uri="{FF2B5EF4-FFF2-40B4-BE49-F238E27FC236}">
+                <a16:creationId xmlns:a16="http://schemas.microsoft.com/office/drawing/2014/main" id="{07C3934F-42C4-C3DF-973C-EFD135112FD7}"/>
+              </a:ext>
+            </a:extLst>
+          </p:cNvPr>
+          <p:cNvSpPr/>
+          <p:nvPr/>
+        </p:nvSpPr>
+        <p:spPr>
+          <a:xfrm>
+            <a:off x="28697" y="3112326"/>
+            <a:ext cx="2325585" cy="1191491"/>
+          </a:xfrm>
+          <a:prstGeom prst="rect">
+            <a:avLst/>
+          </a:prstGeom>
+          <a:solidFill>
+            <a:srgbClr val="D00A14"/>
+          </a:solidFill>
+        </p:spPr>
+        <p:style>
+          <a:lnRef idx="2">
+            <a:schemeClr val="accent1">
+              <a:shade val="15000"/>
+            </a:schemeClr>
+          </a:lnRef>
+          <a:fillRef idx="1">
+            <a:schemeClr val="accent1"/>
+          </a:fillRef>
+          <a:effectRef idx="0">
+            <a:schemeClr val="accent1"/>
+          </a:effectRef>
+          <a:fontRef idx="minor">
+            <a:schemeClr val="lt1"/>
+          </a:fontRef>
+        </p:style>
+        <p:txBody>
+          <a:bodyPr rtlCol="0" anchor="ctr"/>
+          <a:lstStyle/>
+          <a:p>
+            <a:pPr algn="ctr"/>
+            <a:r>
+              <a:rPr lang="en-US" dirty="0"/>
+              <a:t>Liverpool FC</a:t>
+            </a:r>
+            <a:br>
+              <a:rPr lang="en-US" dirty="0"/>
+            </a:br>
+            <a:r>
+              <a:rPr lang="en-US" dirty="0"/>
+              <a:t>#D00A14</a:t>
+            </a:r>
+            <a:br>
+              <a:rPr lang="en-US" dirty="0"/>
+            </a:br>
+            <a:r>
+              <a:rPr lang="en-US" dirty="0"/>
+              <a:t>RGB(208, 10, 20)</a:t>
+            </a:r>
+            <a:endParaRPr lang="en-NZ" dirty="0"/>
+          </a:p>
+        </p:txBody>
+      </p:sp>
+      <p:sp>
+        <p:nvSpPr>
+          <p:cNvPr id="35" name="Rectangle 34">
+            <a:extLst>
+              <a:ext uri="{FF2B5EF4-FFF2-40B4-BE49-F238E27FC236}">
+                <a16:creationId xmlns:a16="http://schemas.microsoft.com/office/drawing/2014/main" id="{6C3A4B06-2730-0B4B-18DB-DA09A6D6974C}"/>
+              </a:ext>
+            </a:extLst>
+          </p:cNvPr>
+          <p:cNvSpPr/>
+          <p:nvPr/>
+        </p:nvSpPr>
+        <p:spPr>
+          <a:xfrm>
+            <a:off x="2480952" y="3112325"/>
+            <a:ext cx="2325585" cy="1191491"/>
+          </a:xfrm>
+          <a:prstGeom prst="rect">
+            <a:avLst/>
+          </a:prstGeom>
+          <a:solidFill>
+            <a:srgbClr val="F74515"/>
+          </a:solidFill>
+        </p:spPr>
+        <p:style>
+          <a:lnRef idx="2">
+            <a:schemeClr val="accent1">
+              <a:shade val="15000"/>
+            </a:schemeClr>
+          </a:lnRef>
+          <a:fillRef idx="1">
+            <a:schemeClr val="accent1"/>
+          </a:fillRef>
+          <a:effectRef idx="0">
+            <a:schemeClr val="accent1"/>
+          </a:effectRef>
+          <a:fontRef idx="minor">
+            <a:schemeClr val="lt1"/>
+          </a:fontRef>
+        </p:style>
+        <p:txBody>
+          <a:bodyPr rtlCol="0" anchor="ctr"/>
+          <a:lstStyle/>
+          <a:p>
+            <a:pPr algn="ctr"/>
+            <a:r>
+              <a:rPr lang="en-US" dirty="0"/>
+              <a:t>Luton Town</a:t>
+            </a:r>
+            <a:br>
+              <a:rPr lang="en-US" dirty="0"/>
+            </a:br>
+            <a:r>
+              <a:rPr lang="en-US" dirty="0"/>
+              <a:t>#F74515</a:t>
+            </a:r>
+            <a:br>
+              <a:rPr lang="en-US" dirty="0"/>
+            </a:br>
+            <a:r>
+              <a:rPr lang="en-US" dirty="0"/>
+              <a:t>RGB(247, 69, 21)</a:t>
+            </a:r>
+            <a:endParaRPr lang="en-NZ" dirty="0"/>
+          </a:p>
+        </p:txBody>
+      </p:sp>
+      <p:sp>
+        <p:nvSpPr>
+          <p:cNvPr id="36" name="Rectangle 35">
+            <a:extLst>
+              <a:ext uri="{FF2B5EF4-FFF2-40B4-BE49-F238E27FC236}">
+                <a16:creationId xmlns:a16="http://schemas.microsoft.com/office/drawing/2014/main" id="{D2CD5A88-EF85-B921-5F0B-07E694CB8427}"/>
+              </a:ext>
+            </a:extLst>
+          </p:cNvPr>
+          <p:cNvSpPr/>
+          <p:nvPr/>
+        </p:nvSpPr>
+        <p:spPr>
+          <a:xfrm>
+            <a:off x="4933207" y="3112325"/>
+            <a:ext cx="2325585" cy="1191491"/>
+          </a:xfrm>
+          <a:prstGeom prst="rect">
+            <a:avLst/>
+          </a:prstGeom>
+          <a:solidFill>
+            <a:srgbClr val="91BFE3"/>
+          </a:solidFill>
+        </p:spPr>
+        <p:style>
+          <a:lnRef idx="2">
+            <a:schemeClr val="accent1">
+              <a:shade val="15000"/>
+            </a:schemeClr>
+          </a:lnRef>
+          <a:fillRef idx="1">
+            <a:schemeClr val="accent1"/>
+          </a:fillRef>
+          <a:effectRef idx="0">
+            <a:schemeClr val="accent1"/>
+          </a:effectRef>
+          <a:fontRef idx="minor">
+            <a:schemeClr val="lt1"/>
+          </a:fontRef>
+        </p:style>
+        <p:txBody>
+          <a:bodyPr rtlCol="0" anchor="ctr"/>
+          <a:lstStyle/>
+          <a:p>
+            <a:pPr algn="ctr"/>
+            <a:r>
+              <a:rPr lang="en-US" dirty="0"/>
+              <a:t>Manchester City</a:t>
+            </a:r>
+            <a:br>
+              <a:rPr lang="en-US" dirty="0"/>
+            </a:br>
+            <a:r>
+              <a:rPr lang="en-US" dirty="0"/>
+              <a:t>#91BFE3</a:t>
+            </a:r>
+            <a:br>
+              <a:rPr lang="en-US" dirty="0"/>
+            </a:br>
+            <a:r>
+              <a:rPr lang="en-US" dirty="0"/>
+              <a:t>RGB(145, 191, 227)</a:t>
+            </a:r>
+            <a:endParaRPr lang="en-NZ" dirty="0"/>
+          </a:p>
+        </p:txBody>
+      </p:sp>
+      <p:sp>
+        <p:nvSpPr>
+          <p:cNvPr id="37" name="Rectangle 36">
+            <a:extLst>
+              <a:ext uri="{FF2B5EF4-FFF2-40B4-BE49-F238E27FC236}">
+                <a16:creationId xmlns:a16="http://schemas.microsoft.com/office/drawing/2014/main" id="{814B5543-1477-3557-63B2-DDE37B402665}"/>
+              </a:ext>
+            </a:extLst>
+          </p:cNvPr>
+          <p:cNvSpPr/>
+          <p:nvPr/>
+        </p:nvSpPr>
+        <p:spPr>
+          <a:xfrm>
+            <a:off x="7385462" y="3112325"/>
+            <a:ext cx="2325585" cy="1191491"/>
+          </a:xfrm>
+          <a:prstGeom prst="rect">
+            <a:avLst/>
+          </a:prstGeom>
+          <a:solidFill>
+            <a:srgbClr val="E30C0C"/>
+          </a:solidFill>
+        </p:spPr>
+        <p:style>
+          <a:lnRef idx="2">
+            <a:schemeClr val="accent1">
+              <a:shade val="15000"/>
+            </a:schemeClr>
+          </a:lnRef>
+          <a:fillRef idx="1">
+            <a:schemeClr val="accent1"/>
+          </a:fillRef>
+          <a:effectRef idx="0">
+            <a:schemeClr val="accent1"/>
+          </a:effectRef>
+          <a:fontRef idx="minor">
+            <a:schemeClr val="lt1"/>
+          </a:fontRef>
+        </p:style>
+        <p:txBody>
+          <a:bodyPr rtlCol="0" anchor="ctr"/>
+          <a:lstStyle/>
+          <a:p>
+            <a:pPr algn="ctr"/>
+            <a:r>
+              <a:rPr lang="en-US" dirty="0"/>
+              <a:t>Manchester United</a:t>
+            </a:r>
+            <a:br>
+              <a:rPr lang="en-US" dirty="0"/>
+            </a:br>
+            <a:r>
+              <a:rPr lang="en-US" dirty="0"/>
+              <a:t>#E30C0C</a:t>
+            </a:r>
+            <a:br>
+              <a:rPr lang="en-US" dirty="0"/>
+            </a:br>
+            <a:r>
+              <a:rPr lang="en-US" dirty="0"/>
+              <a:t>RGB(227, 12, 12)</a:t>
+            </a:r>
+            <a:endParaRPr lang="en-NZ" dirty="0"/>
+          </a:p>
+        </p:txBody>
+      </p:sp>
+      <p:sp>
+        <p:nvSpPr>
+          <p:cNvPr id="38" name="Rectangle 37">
+            <a:extLst>
+              <a:ext uri="{FF2B5EF4-FFF2-40B4-BE49-F238E27FC236}">
+                <a16:creationId xmlns:a16="http://schemas.microsoft.com/office/drawing/2014/main" id="{D9D4F169-1256-A8C0-B05C-8514A4180758}"/>
+              </a:ext>
+            </a:extLst>
+          </p:cNvPr>
+          <p:cNvSpPr/>
+          <p:nvPr/>
+        </p:nvSpPr>
+        <p:spPr>
+          <a:xfrm>
+            <a:off x="9837717" y="3112325"/>
+            <a:ext cx="2325585" cy="1191491"/>
+          </a:xfrm>
+          <a:prstGeom prst="rect">
+            <a:avLst/>
+          </a:prstGeom>
+          <a:solidFill>
+            <a:srgbClr val="292526"/>
+          </a:solidFill>
+        </p:spPr>
+        <p:style>
+          <a:lnRef idx="2">
+            <a:schemeClr val="accent1">
+              <a:shade val="15000"/>
+            </a:schemeClr>
+          </a:lnRef>
+          <a:fillRef idx="1">
+            <a:schemeClr val="accent1"/>
+          </a:fillRef>
+          <a:effectRef idx="0">
+            <a:schemeClr val="accent1"/>
+          </a:effectRef>
+          <a:fontRef idx="minor">
+            <a:schemeClr val="lt1"/>
+          </a:fontRef>
+        </p:style>
+        <p:txBody>
+          <a:bodyPr rtlCol="0" anchor="ctr"/>
+          <a:lstStyle/>
+          <a:p>
+            <a:pPr algn="ctr"/>
+            <a:r>
+              <a:rPr lang="en-US" dirty="0"/>
+              <a:t>Newcastle United</a:t>
+            </a:r>
+            <a:br>
+              <a:rPr lang="en-US" dirty="0"/>
+            </a:br>
+            <a:r>
+              <a:rPr lang="en-US" dirty="0"/>
+              <a:t>#292526</a:t>
+            </a:r>
+            <a:br>
+              <a:rPr lang="en-US" dirty="0"/>
+            </a:br>
+            <a:r>
+              <a:rPr lang="en-US" dirty="0"/>
+              <a:t>RGB(41, 37, 38)</a:t>
+            </a:r>
+            <a:endParaRPr lang="en-NZ" dirty="0"/>
+          </a:p>
+        </p:txBody>
+      </p:sp>
+      <p:sp>
+        <p:nvSpPr>
+          <p:cNvPr id="39" name="Rectangle 38">
+            <a:extLst>
+              <a:ext uri="{FF2B5EF4-FFF2-40B4-BE49-F238E27FC236}">
+                <a16:creationId xmlns:a16="http://schemas.microsoft.com/office/drawing/2014/main" id="{1228339F-88C4-231D-3710-BA593C0C0F8D}"/>
+              </a:ext>
+            </a:extLst>
+          </p:cNvPr>
+          <p:cNvSpPr/>
+          <p:nvPr/>
+        </p:nvSpPr>
+        <p:spPr>
+          <a:xfrm>
+            <a:off x="28697" y="4392882"/>
+            <a:ext cx="2325585" cy="1191491"/>
+          </a:xfrm>
+          <a:prstGeom prst="rect">
+            <a:avLst/>
+          </a:prstGeom>
+          <a:solidFill>
+            <a:srgbClr val="C81D39"/>
+          </a:solidFill>
+        </p:spPr>
+        <p:style>
+          <a:lnRef idx="2">
+            <a:schemeClr val="accent1">
+              <a:shade val="15000"/>
+            </a:schemeClr>
+          </a:lnRef>
+          <a:fillRef idx="1">
+            <a:schemeClr val="accent1"/>
+          </a:fillRef>
+          <a:effectRef idx="0">
+            <a:schemeClr val="accent1"/>
+          </a:effectRef>
+          <a:fontRef idx="minor">
+            <a:schemeClr val="lt1"/>
+          </a:fontRef>
+        </p:style>
+        <p:txBody>
+          <a:bodyPr rtlCol="0" anchor="ctr"/>
+          <a:lstStyle/>
+          <a:p>
+            <a:pPr algn="ctr"/>
+            <a:r>
+              <a:rPr lang="en-US" dirty="0"/>
+              <a:t>Nottingham Forest</a:t>
+            </a:r>
+            <a:br>
+              <a:rPr lang="en-US" dirty="0"/>
+            </a:br>
+            <a:r>
+              <a:rPr lang="en-US" dirty="0"/>
+              <a:t>#C81D39</a:t>
+            </a:r>
+            <a:br>
+              <a:rPr lang="en-US" dirty="0"/>
+            </a:br>
+            <a:r>
+              <a:rPr lang="en-US" dirty="0"/>
+              <a:t>RGB(200, 29, 57)</a:t>
+            </a:r>
+            <a:endParaRPr lang="en-NZ" dirty="0"/>
+          </a:p>
+        </p:txBody>
+      </p:sp>
+      <p:sp>
+        <p:nvSpPr>
+          <p:cNvPr id="40" name="Rectangle 39">
+            <a:extLst>
+              <a:ext uri="{FF2B5EF4-FFF2-40B4-BE49-F238E27FC236}">
+                <a16:creationId xmlns:a16="http://schemas.microsoft.com/office/drawing/2014/main" id="{4F3F89F5-AA1D-3069-BB4A-2326E444A582}"/>
+              </a:ext>
+            </a:extLst>
+          </p:cNvPr>
+          <p:cNvSpPr/>
+          <p:nvPr/>
+        </p:nvSpPr>
+        <p:spPr>
+          <a:xfrm>
+            <a:off x="2480952" y="4392881"/>
+            <a:ext cx="2325585" cy="1191491"/>
+          </a:xfrm>
+          <a:prstGeom prst="rect">
+            <a:avLst/>
+          </a:prstGeom>
+          <a:solidFill>
+            <a:srgbClr val="E8101D"/>
+          </a:solidFill>
+        </p:spPr>
+        <p:style>
+          <a:lnRef idx="2">
+            <a:schemeClr val="accent1">
+              <a:shade val="15000"/>
+            </a:schemeClr>
+          </a:lnRef>
+          <a:fillRef idx="1">
+            <a:schemeClr val="accent1"/>
+          </a:fillRef>
+          <a:effectRef idx="0">
+            <a:schemeClr val="accent1"/>
+          </a:effectRef>
+          <a:fontRef idx="minor">
+            <a:schemeClr val="lt1"/>
+          </a:fontRef>
+        </p:style>
+        <p:txBody>
+          <a:bodyPr rtlCol="0" anchor="ctr"/>
+          <a:lstStyle/>
+          <a:p>
+            <a:pPr algn="ctr"/>
+            <a:r>
+              <a:rPr lang="en-US" dirty="0"/>
+              <a:t>Sheffield United</a:t>
+            </a:r>
+            <a:br>
+              <a:rPr lang="en-US" dirty="0"/>
+            </a:br>
+            <a:r>
+              <a:rPr lang="en-US" dirty="0"/>
+              <a:t>#E8101D</a:t>
+            </a:r>
+            <a:br>
+              <a:rPr lang="en-US" dirty="0"/>
+            </a:br>
+            <a:r>
+              <a:rPr lang="en-US" dirty="0"/>
+              <a:t>RGB(232, 16, 29)</a:t>
+            </a:r>
+            <a:endParaRPr lang="en-NZ" dirty="0"/>
+          </a:p>
+        </p:txBody>
+      </p:sp>
+      <p:sp>
+        <p:nvSpPr>
+          <p:cNvPr id="41" name="Rectangle 40">
+            <a:extLst>
+              <a:ext uri="{FF2B5EF4-FFF2-40B4-BE49-F238E27FC236}">
+                <a16:creationId xmlns:a16="http://schemas.microsoft.com/office/drawing/2014/main" id="{490B524C-E1E7-C22A-D6C4-38673914879B}"/>
+              </a:ext>
+            </a:extLst>
+          </p:cNvPr>
+          <p:cNvSpPr/>
+          <p:nvPr/>
+        </p:nvSpPr>
+        <p:spPr>
+          <a:xfrm>
+            <a:off x="4933207" y="4392881"/>
+            <a:ext cx="2325585" cy="1191491"/>
+          </a:xfrm>
+          <a:prstGeom prst="rect">
+            <a:avLst/>
+          </a:prstGeom>
+          <a:solidFill>
+            <a:srgbClr val="FAFAFA"/>
+          </a:solidFill>
+        </p:spPr>
+        <p:style>
+          <a:lnRef idx="2">
+            <a:schemeClr val="accent1">
+              <a:shade val="15000"/>
+            </a:schemeClr>
+          </a:lnRef>
+          <a:fillRef idx="1">
+            <a:schemeClr val="accent1"/>
+          </a:fillRef>
+          <a:effectRef idx="0">
+            <a:schemeClr val="accent1"/>
+          </a:effectRef>
+          <a:fontRef idx="minor">
+            <a:schemeClr val="lt1"/>
+          </a:fontRef>
+        </p:style>
+        <p:txBody>
+          <a:bodyPr rtlCol="0" anchor="ctr"/>
+          <a:lstStyle/>
+          <a:p>
+            <a:pPr algn="ctr"/>
+            <a:r>
+              <a:rPr lang="en-US" dirty="0">
+                <a:solidFill>
+                  <a:schemeClr val="tx1"/>
+                </a:solidFill>
+              </a:rPr>
+              <a:t>Tottenham Hotspur</a:t>
+            </a:r>
+            <a:br>
+              <a:rPr lang="en-US" dirty="0">
+                <a:solidFill>
+                  <a:schemeClr val="tx1"/>
+                </a:solidFill>
+              </a:rPr>
+            </a:br>
+            <a:r>
+              <a:rPr lang="en-US" dirty="0">
+                <a:solidFill>
+                  <a:schemeClr val="tx1"/>
+                </a:solidFill>
+              </a:rPr>
+              <a:t>#FAFAFA</a:t>
+            </a:r>
+            <a:br>
+              <a:rPr lang="en-US" dirty="0">
+                <a:solidFill>
+                  <a:schemeClr val="tx1"/>
+                </a:solidFill>
+              </a:rPr>
+            </a:br>
+            <a:r>
+              <a:rPr lang="en-US" dirty="0">
+                <a:solidFill>
+                  <a:schemeClr val="tx1"/>
+                </a:solidFill>
+              </a:rPr>
+              <a:t>RGB(250, 250, 250)</a:t>
+            </a:r>
+            <a:endParaRPr lang="en-NZ" dirty="0">
+              <a:solidFill>
+                <a:schemeClr val="tx1"/>
+              </a:solidFill>
+            </a:endParaRPr>
+          </a:p>
+        </p:txBody>
+      </p:sp>
+      <p:sp>
+        <p:nvSpPr>
+          <p:cNvPr id="42" name="Rectangle 41">
+            <a:extLst>
+              <a:ext uri="{FF2B5EF4-FFF2-40B4-BE49-F238E27FC236}">
+                <a16:creationId xmlns:a16="http://schemas.microsoft.com/office/drawing/2014/main" id="{8A96B601-2CEA-437B-6654-D202134B6110}"/>
+              </a:ext>
+            </a:extLst>
+          </p:cNvPr>
+          <p:cNvSpPr/>
+          <p:nvPr/>
+        </p:nvSpPr>
+        <p:spPr>
+          <a:xfrm>
+            <a:off x="7385462" y="4392881"/>
+            <a:ext cx="2325585" cy="1191491"/>
+          </a:xfrm>
+          <a:prstGeom prst="rect">
+            <a:avLst/>
+          </a:prstGeom>
+          <a:solidFill>
+            <a:srgbClr val="772635"/>
+          </a:solidFill>
+        </p:spPr>
+        <p:style>
+          <a:lnRef idx="2">
+            <a:schemeClr val="accent1">
+              <a:shade val="15000"/>
+            </a:schemeClr>
+          </a:lnRef>
+          <a:fillRef idx="1">
+            <a:schemeClr val="accent1"/>
+          </a:fillRef>
+          <a:effectRef idx="0">
+            <a:schemeClr val="accent1"/>
+          </a:effectRef>
+          <a:fontRef idx="minor">
+            <a:schemeClr val="lt1"/>
+          </a:fontRef>
+        </p:style>
+        <p:txBody>
+          <a:bodyPr rtlCol="0" anchor="ctr"/>
+          <a:lstStyle/>
+          <a:p>
+            <a:pPr algn="ctr"/>
+            <a:r>
+              <a:rPr lang="en-US" dirty="0"/>
+              <a:t>West Ham United</a:t>
+            </a:r>
+            <a:br>
+              <a:rPr lang="en-US" dirty="0"/>
+            </a:br>
+            <a:r>
+              <a:rPr lang="en-US" dirty="0"/>
+              <a:t>#772635</a:t>
+            </a:r>
+            <a:br>
+              <a:rPr lang="en-US" dirty="0"/>
+            </a:br>
+            <a:r>
+              <a:rPr lang="en-US" dirty="0"/>
+              <a:t>RGB(119, 38, 53)</a:t>
+            </a:r>
+            <a:endParaRPr lang="en-NZ" dirty="0"/>
+          </a:p>
+        </p:txBody>
+      </p:sp>
+      <p:sp>
+        <p:nvSpPr>
+          <p:cNvPr id="43" name="Rectangle 42">
+            <a:extLst>
+              <a:ext uri="{FF2B5EF4-FFF2-40B4-BE49-F238E27FC236}">
+                <a16:creationId xmlns:a16="http://schemas.microsoft.com/office/drawing/2014/main" id="{0E24A867-B399-8AAE-9455-986F1F2D4CCB}"/>
+              </a:ext>
+            </a:extLst>
+          </p:cNvPr>
+          <p:cNvSpPr/>
+          <p:nvPr/>
+        </p:nvSpPr>
+        <p:spPr>
+          <a:xfrm>
+            <a:off x="9837717" y="4392881"/>
+            <a:ext cx="2325585" cy="1191491"/>
+          </a:xfrm>
+          <a:prstGeom prst="rect">
+            <a:avLst/>
+          </a:prstGeom>
+          <a:solidFill>
+            <a:srgbClr val="FA9D10"/>
+          </a:solidFill>
+        </p:spPr>
+        <p:style>
+          <a:lnRef idx="2">
+            <a:schemeClr val="accent1">
+              <a:shade val="15000"/>
+            </a:schemeClr>
+          </a:lnRef>
+          <a:fillRef idx="1">
+            <a:schemeClr val="accent1"/>
+          </a:fillRef>
+          <a:effectRef idx="0">
+            <a:schemeClr val="accent1"/>
+          </a:effectRef>
+          <a:fontRef idx="minor">
+            <a:schemeClr val="lt1"/>
+          </a:fontRef>
+        </p:style>
+        <p:txBody>
+          <a:bodyPr rtlCol="0" anchor="ctr"/>
+          <a:lstStyle/>
+          <a:p>
+            <a:pPr algn="ctr"/>
+            <a:r>
+              <a:rPr lang="en-US" dirty="0"/>
+              <a:t>Wolverhampton Wanderers</a:t>
+            </a:r>
+            <a:br>
+              <a:rPr lang="en-US" dirty="0"/>
+            </a:br>
+            <a:r>
+              <a:rPr lang="en-US" dirty="0"/>
+              <a:t>#FA9D10</a:t>
+            </a:r>
+            <a:br>
+              <a:rPr lang="en-US" dirty="0"/>
+            </a:br>
+            <a:r>
+              <a:rPr lang="en-US" dirty="0"/>
+              <a:t>RGB(250, 157, 16)</a:t>
+            </a:r>
+            <a:endParaRPr lang="en-NZ" dirty="0"/>
+          </a:p>
+        </p:txBody>
+      </p:sp>
+    </p:spTree>
+    <p:extLst>
+      <p:ext uri="{BB962C8B-B14F-4D97-AF65-F5344CB8AC3E}">
+        <p14:creationId xmlns:p14="http://schemas.microsoft.com/office/powerpoint/2010/main" val="339203755"/>
       </p:ext>
     </p:extLst>
   </p:cSld>

</xml_diff>